<commit_message>
fixing images and reorganizing poster
</commit_message>
<xml_diff>
--- a/toRendre/PDS-INFO-2-G1.pptx
+++ b/toRendre/PDS-INFO-2-G1.pptx
@@ -1,19 +1,114 @@
 
 <file path=ppt/presentation.xml><?xml version="1.0" encoding="utf-8"?>
-<p:presentation xmlns:a="http://schemas.openxmlformats.org/drawingml/2006/main" xmlns:p="http://schemas.openxmlformats.org/presentationml/2006/main" xmlns:r="http://schemas.openxmlformats.org/officeDocument/2006/relationships" xmlns:p14="http://schemas.microsoft.com/office/powerpoint/2010/main" xmlns:p15="http://schemas.microsoft.com/office/powerpoint/2012/main" xmlns:mc="http://schemas.openxmlformats.org/markup-compatibility/2006">
+<p:presentation xmlns:a="http://schemas.openxmlformats.org/drawingml/2006/main" xmlns:r="http://schemas.openxmlformats.org/officeDocument/2006/relationships" xmlns:p="http://schemas.openxmlformats.org/presentationml/2006/main">
   <p:sldMasterIdLst>
-    <p:sldMasterId id="2147483648" r:id="rId2"/>
+    <p:sldMasterId id="2147483648" r:id="rId1"/>
   </p:sldMasterIdLst>
   <p:sldIdLst>
-    <p:sldId id="256" r:id="rId3"/>
+    <p:sldId id="256" r:id="rId2"/>
   </p:sldIdLst>
-  <p:sldSz cx="32899350" cy="43562587"/>
-  <p:notesSz cx="7559675" cy="10691812"/>
+  <p:sldSz cx="32899350" cy="43562588"/>
+  <p:notesSz cx="7559675" cy="10691813"/>
+  <p:defaultTextStyle>
+    <a:defPPr>
+      <a:defRPr lang="fr-FR"/>
+    </a:defPPr>
+    <a:lvl1pPr marL="0" algn="l" defTabSz="914400" rtl="0" eaLnBrk="1" latinLnBrk="0" hangingPunct="1">
+      <a:defRPr sz="1800" kern="1200">
+        <a:solidFill>
+          <a:schemeClr val="tx1"/>
+        </a:solidFill>
+        <a:latin typeface="+mn-lt"/>
+        <a:ea typeface="+mn-ea"/>
+        <a:cs typeface="+mn-cs"/>
+      </a:defRPr>
+    </a:lvl1pPr>
+    <a:lvl2pPr marL="457200" algn="l" defTabSz="914400" rtl="0" eaLnBrk="1" latinLnBrk="0" hangingPunct="1">
+      <a:defRPr sz="1800" kern="1200">
+        <a:solidFill>
+          <a:schemeClr val="tx1"/>
+        </a:solidFill>
+        <a:latin typeface="+mn-lt"/>
+        <a:ea typeface="+mn-ea"/>
+        <a:cs typeface="+mn-cs"/>
+      </a:defRPr>
+    </a:lvl2pPr>
+    <a:lvl3pPr marL="914400" algn="l" defTabSz="914400" rtl="0" eaLnBrk="1" latinLnBrk="0" hangingPunct="1">
+      <a:defRPr sz="1800" kern="1200">
+        <a:solidFill>
+          <a:schemeClr val="tx1"/>
+        </a:solidFill>
+        <a:latin typeface="+mn-lt"/>
+        <a:ea typeface="+mn-ea"/>
+        <a:cs typeface="+mn-cs"/>
+      </a:defRPr>
+    </a:lvl3pPr>
+    <a:lvl4pPr marL="1371600" algn="l" defTabSz="914400" rtl="0" eaLnBrk="1" latinLnBrk="0" hangingPunct="1">
+      <a:defRPr sz="1800" kern="1200">
+        <a:solidFill>
+          <a:schemeClr val="tx1"/>
+        </a:solidFill>
+        <a:latin typeface="+mn-lt"/>
+        <a:ea typeface="+mn-ea"/>
+        <a:cs typeface="+mn-cs"/>
+      </a:defRPr>
+    </a:lvl4pPr>
+    <a:lvl5pPr marL="1828800" algn="l" defTabSz="914400" rtl="0" eaLnBrk="1" latinLnBrk="0" hangingPunct="1">
+      <a:defRPr sz="1800" kern="1200">
+        <a:solidFill>
+          <a:schemeClr val="tx1"/>
+        </a:solidFill>
+        <a:latin typeface="+mn-lt"/>
+        <a:ea typeface="+mn-ea"/>
+        <a:cs typeface="+mn-cs"/>
+      </a:defRPr>
+    </a:lvl5pPr>
+    <a:lvl6pPr marL="2286000" algn="l" defTabSz="914400" rtl="0" eaLnBrk="1" latinLnBrk="0" hangingPunct="1">
+      <a:defRPr sz="1800" kern="1200">
+        <a:solidFill>
+          <a:schemeClr val="tx1"/>
+        </a:solidFill>
+        <a:latin typeface="+mn-lt"/>
+        <a:ea typeface="+mn-ea"/>
+        <a:cs typeface="+mn-cs"/>
+      </a:defRPr>
+    </a:lvl6pPr>
+    <a:lvl7pPr marL="2743200" algn="l" defTabSz="914400" rtl="0" eaLnBrk="1" latinLnBrk="0" hangingPunct="1">
+      <a:defRPr sz="1800" kern="1200">
+        <a:solidFill>
+          <a:schemeClr val="tx1"/>
+        </a:solidFill>
+        <a:latin typeface="+mn-lt"/>
+        <a:ea typeface="+mn-ea"/>
+        <a:cs typeface="+mn-cs"/>
+      </a:defRPr>
+    </a:lvl7pPr>
+    <a:lvl8pPr marL="3200400" algn="l" defTabSz="914400" rtl="0" eaLnBrk="1" latinLnBrk="0" hangingPunct="1">
+      <a:defRPr sz="1800" kern="1200">
+        <a:solidFill>
+          <a:schemeClr val="tx1"/>
+        </a:solidFill>
+        <a:latin typeface="+mn-lt"/>
+        <a:ea typeface="+mn-ea"/>
+        <a:cs typeface="+mn-cs"/>
+      </a:defRPr>
+    </a:lvl8pPr>
+    <a:lvl9pPr marL="3657600" algn="l" defTabSz="914400" rtl="0" eaLnBrk="1" latinLnBrk="0" hangingPunct="1">
+      <a:defRPr sz="1800" kern="1200">
+        <a:solidFill>
+          <a:schemeClr val="tx1"/>
+        </a:solidFill>
+        <a:latin typeface="+mn-lt"/>
+        <a:ea typeface="+mn-ea"/>
+        <a:cs typeface="+mn-cs"/>
+      </a:defRPr>
+    </a:lvl9pPr>
+  </p:defaultTextStyle>
 </p:presentation>
 </file>
 
 <file path=ppt/slideLayouts/slideLayout1.xml><?xml version="1.0" encoding="utf-8"?>
-<p:sldLayout xmlns:a="http://schemas.openxmlformats.org/drawingml/2006/main" xmlns:p="http://schemas.openxmlformats.org/presentationml/2006/main" xmlns:r="http://schemas.openxmlformats.org/officeDocument/2006/relationships" xmlns:p14="http://schemas.microsoft.com/office/powerpoint/2010/main" xmlns:p15="http://schemas.microsoft.com/office/powerpoint/2012/main" xmlns:mc="http://schemas.openxmlformats.org/markup-compatibility/2006" type="blank" preserve="1">
+<p:sldLayout xmlns:a="http://schemas.openxmlformats.org/drawingml/2006/main" xmlns:r="http://schemas.openxmlformats.org/officeDocument/2006/relationships" xmlns:p="http://schemas.openxmlformats.org/presentationml/2006/main" type="blank" preserve="1">
   <p:cSld name="Blank Slide">
     <p:spTree>
       <p:nvGrpSpPr>
@@ -31,11 +126,14 @@
       </p:grpSpPr>
     </p:spTree>
   </p:cSld>
+  <p:clrMapOvr>
+    <a:masterClrMapping/>
+  </p:clrMapOvr>
 </p:sldLayout>
 </file>
 
 <file path=ppt/slideLayouts/slideLayout10.xml><?xml version="1.0" encoding="utf-8"?>
-<p:sldLayout xmlns:a="http://schemas.openxmlformats.org/drawingml/2006/main" xmlns:p="http://schemas.openxmlformats.org/presentationml/2006/main" xmlns:r="http://schemas.openxmlformats.org/officeDocument/2006/relationships" xmlns:p14="http://schemas.microsoft.com/office/powerpoint/2010/main" xmlns:p15="http://schemas.microsoft.com/office/powerpoint/2012/main" xmlns:mc="http://schemas.openxmlformats.org/markup-compatibility/2006" type="objOverTx" preserve="1">
+<p:sldLayout xmlns:a="http://schemas.openxmlformats.org/drawingml/2006/main" xmlns:r="http://schemas.openxmlformats.org/officeDocument/2006/relationships" xmlns:p="http://schemas.openxmlformats.org/presentationml/2006/main" type="objOverTx" preserve="1">
   <p:cSld name="Title, Content over Content">
     <p:spTree>
       <p:nvGrpSpPr>
@@ -71,12 +169,13 @@
           </a:prstGeom>
         </p:spPr>
         <p:txBody>
-          <a:bodyPr lIns="0" rIns="0" tIns="0" bIns="0" anchor="ctr">
+          <a:bodyPr lIns="0" tIns="0" rIns="0" bIns="0" anchor="ctr">
             <a:spAutoFit/>
           </a:bodyPr>
+          <a:lstStyle/>
           <a:p>
             <a:pPr algn="ctr"/>
-            <a:endParaRPr b="0" lang="fr-FR" sz="4400" spc="-1" strike="noStrike">
+            <a:endParaRPr lang="fr-FR" sz="4400" b="0" strike="noStrike" spc="-1">
               <a:latin typeface="Arial"/>
             </a:endParaRPr>
           </a:p>
@@ -102,11 +201,12 @@
           </a:prstGeom>
         </p:spPr>
         <p:txBody>
-          <a:bodyPr lIns="0" rIns="0" tIns="0" bIns="0">
+          <a:bodyPr lIns="0" tIns="0" rIns="0" bIns="0">
             <a:normAutofit/>
           </a:bodyPr>
-          <a:p>
-            <a:endParaRPr b="0" lang="fr-FR" sz="3200" spc="-1" strike="noStrike">
+          <a:lstStyle/>
+          <a:p>
+            <a:endParaRPr lang="fr-FR" sz="3200" b="0" strike="noStrike" spc="-1">
               <a:latin typeface="Arial"/>
             </a:endParaRPr>
           </a:p>
@@ -132,11 +232,12 @@
           </a:prstGeom>
         </p:spPr>
         <p:txBody>
-          <a:bodyPr lIns="0" rIns="0" tIns="0" bIns="0">
+          <a:bodyPr lIns="0" tIns="0" rIns="0" bIns="0">
             <a:normAutofit/>
           </a:bodyPr>
-          <a:p>
-            <a:endParaRPr b="0" lang="fr-FR" sz="3200" spc="-1" strike="noStrike">
+          <a:lstStyle/>
+          <a:p>
+            <a:endParaRPr lang="fr-FR" sz="3200" b="0" strike="noStrike" spc="-1">
               <a:latin typeface="Arial"/>
             </a:endParaRPr>
           </a:p>
@@ -144,11 +245,14 @@
       </p:sp>
     </p:spTree>
   </p:cSld>
+  <p:clrMapOvr>
+    <a:masterClrMapping/>
+  </p:clrMapOvr>
 </p:sldLayout>
 </file>
 
 <file path=ppt/slideLayouts/slideLayout11.xml><?xml version="1.0" encoding="utf-8"?>
-<p:sldLayout xmlns:a="http://schemas.openxmlformats.org/drawingml/2006/main" xmlns:p="http://schemas.openxmlformats.org/presentationml/2006/main" xmlns:r="http://schemas.openxmlformats.org/officeDocument/2006/relationships" xmlns:p14="http://schemas.microsoft.com/office/powerpoint/2010/main" xmlns:p15="http://schemas.microsoft.com/office/powerpoint/2012/main" xmlns:mc="http://schemas.openxmlformats.org/markup-compatibility/2006" type="fourObj" preserve="1">
+<p:sldLayout xmlns:a="http://schemas.openxmlformats.org/drawingml/2006/main" xmlns:r="http://schemas.openxmlformats.org/officeDocument/2006/relationships" xmlns:p="http://schemas.openxmlformats.org/presentationml/2006/main" type="fourObj" preserve="1">
   <p:cSld name="Title, 4 Content">
     <p:spTree>
       <p:nvGrpSpPr>
@@ -184,12 +288,13 @@
           </a:prstGeom>
         </p:spPr>
         <p:txBody>
-          <a:bodyPr lIns="0" rIns="0" tIns="0" bIns="0" anchor="ctr">
+          <a:bodyPr lIns="0" tIns="0" rIns="0" bIns="0" anchor="ctr">
             <a:spAutoFit/>
           </a:bodyPr>
+          <a:lstStyle/>
           <a:p>
             <a:pPr algn="ctr"/>
-            <a:endParaRPr b="0" lang="fr-FR" sz="4400" spc="-1" strike="noStrike">
+            <a:endParaRPr lang="fr-FR" sz="4400" b="0" strike="noStrike" spc="-1">
               <a:latin typeface="Arial"/>
             </a:endParaRPr>
           </a:p>
@@ -215,11 +320,12 @@
           </a:prstGeom>
         </p:spPr>
         <p:txBody>
-          <a:bodyPr lIns="0" rIns="0" tIns="0" bIns="0">
+          <a:bodyPr lIns="0" tIns="0" rIns="0" bIns="0">
             <a:normAutofit/>
           </a:bodyPr>
-          <a:p>
-            <a:endParaRPr b="0" lang="fr-FR" sz="3200" spc="-1" strike="noStrike">
+          <a:lstStyle/>
+          <a:p>
+            <a:endParaRPr lang="fr-FR" sz="3200" b="0" strike="noStrike" spc="-1">
               <a:latin typeface="Arial"/>
             </a:endParaRPr>
           </a:p>
@@ -245,11 +351,12 @@
           </a:prstGeom>
         </p:spPr>
         <p:txBody>
-          <a:bodyPr lIns="0" rIns="0" tIns="0" bIns="0">
+          <a:bodyPr lIns="0" tIns="0" rIns="0" bIns="0">
             <a:normAutofit/>
           </a:bodyPr>
-          <a:p>
-            <a:endParaRPr b="0" lang="fr-FR" sz="3200" spc="-1" strike="noStrike">
+          <a:lstStyle/>
+          <a:p>
+            <a:endParaRPr lang="fr-FR" sz="3200" b="0" strike="noStrike" spc="-1">
               <a:latin typeface="Arial"/>
             </a:endParaRPr>
           </a:p>
@@ -275,11 +382,12 @@
           </a:prstGeom>
         </p:spPr>
         <p:txBody>
-          <a:bodyPr lIns="0" rIns="0" tIns="0" bIns="0">
+          <a:bodyPr lIns="0" tIns="0" rIns="0" bIns="0">
             <a:normAutofit/>
           </a:bodyPr>
-          <a:p>
-            <a:endParaRPr b="0" lang="fr-FR" sz="3200" spc="-1" strike="noStrike">
+          <a:lstStyle/>
+          <a:p>
+            <a:endParaRPr lang="fr-FR" sz="3200" b="0" strike="noStrike" spc="-1">
               <a:latin typeface="Arial"/>
             </a:endParaRPr>
           </a:p>
@@ -305,11 +413,12 @@
           </a:prstGeom>
         </p:spPr>
         <p:txBody>
-          <a:bodyPr lIns="0" rIns="0" tIns="0" bIns="0">
+          <a:bodyPr lIns="0" tIns="0" rIns="0" bIns="0">
             <a:normAutofit/>
           </a:bodyPr>
-          <a:p>
-            <a:endParaRPr b="0" lang="fr-FR" sz="3200" spc="-1" strike="noStrike">
+          <a:lstStyle/>
+          <a:p>
+            <a:endParaRPr lang="fr-FR" sz="3200" b="0" strike="noStrike" spc="-1">
               <a:latin typeface="Arial"/>
             </a:endParaRPr>
           </a:p>
@@ -317,11 +426,14 @@
       </p:sp>
     </p:spTree>
   </p:cSld>
+  <p:clrMapOvr>
+    <a:masterClrMapping/>
+  </p:clrMapOvr>
 </p:sldLayout>
 </file>
 
 <file path=ppt/slideLayouts/slideLayout12.xml><?xml version="1.0" encoding="utf-8"?>
-<p:sldLayout xmlns:a="http://schemas.openxmlformats.org/drawingml/2006/main" xmlns:p="http://schemas.openxmlformats.org/presentationml/2006/main" xmlns:r="http://schemas.openxmlformats.org/officeDocument/2006/relationships" xmlns:p14="http://schemas.microsoft.com/office/powerpoint/2010/main" xmlns:p15="http://schemas.microsoft.com/office/powerpoint/2012/main" xmlns:mc="http://schemas.openxmlformats.org/markup-compatibility/2006" type="blank" preserve="1">
+<p:sldLayout xmlns:a="http://schemas.openxmlformats.org/drawingml/2006/main" xmlns:r="http://schemas.openxmlformats.org/officeDocument/2006/relationships" xmlns:p="http://schemas.openxmlformats.org/presentationml/2006/main" type="blank" preserve="1">
   <p:cSld name="Title, 6 Content">
     <p:spTree>
       <p:nvGrpSpPr>
@@ -357,12 +469,13 @@
           </a:prstGeom>
         </p:spPr>
         <p:txBody>
-          <a:bodyPr lIns="0" rIns="0" tIns="0" bIns="0" anchor="ctr">
+          <a:bodyPr lIns="0" tIns="0" rIns="0" bIns="0" anchor="ctr">
             <a:spAutoFit/>
           </a:bodyPr>
+          <a:lstStyle/>
           <a:p>
             <a:pPr algn="ctr"/>
-            <a:endParaRPr b="0" lang="fr-FR" sz="4400" spc="-1" strike="noStrike">
+            <a:endParaRPr lang="fr-FR" sz="4400" b="0" strike="noStrike" spc="-1">
               <a:latin typeface="Arial"/>
             </a:endParaRPr>
           </a:p>
@@ -388,11 +501,12 @@
           </a:prstGeom>
         </p:spPr>
         <p:txBody>
-          <a:bodyPr lIns="0" rIns="0" tIns="0" bIns="0">
+          <a:bodyPr lIns="0" tIns="0" rIns="0" bIns="0">
             <a:normAutofit/>
           </a:bodyPr>
-          <a:p>
-            <a:endParaRPr b="0" lang="fr-FR" sz="3200" spc="-1" strike="noStrike">
+          <a:lstStyle/>
+          <a:p>
+            <a:endParaRPr lang="fr-FR" sz="3200" b="0" strike="noStrike" spc="-1">
               <a:latin typeface="Arial"/>
             </a:endParaRPr>
           </a:p>
@@ -418,11 +532,12 @@
           </a:prstGeom>
         </p:spPr>
         <p:txBody>
-          <a:bodyPr lIns="0" rIns="0" tIns="0" bIns="0">
+          <a:bodyPr lIns="0" tIns="0" rIns="0" bIns="0">
             <a:normAutofit/>
           </a:bodyPr>
-          <a:p>
-            <a:endParaRPr b="0" lang="fr-FR" sz="3200" spc="-1" strike="noStrike">
+          <a:lstStyle/>
+          <a:p>
+            <a:endParaRPr lang="fr-FR" sz="3200" b="0" strike="noStrike" spc="-1">
               <a:latin typeface="Arial"/>
             </a:endParaRPr>
           </a:p>
@@ -448,11 +563,12 @@
           </a:prstGeom>
         </p:spPr>
         <p:txBody>
-          <a:bodyPr lIns="0" rIns="0" tIns="0" bIns="0">
+          <a:bodyPr lIns="0" tIns="0" rIns="0" bIns="0">
             <a:normAutofit/>
           </a:bodyPr>
-          <a:p>
-            <a:endParaRPr b="0" lang="fr-FR" sz="3200" spc="-1" strike="noStrike">
+          <a:lstStyle/>
+          <a:p>
+            <a:endParaRPr lang="fr-FR" sz="3200" b="0" strike="noStrike" spc="-1">
               <a:latin typeface="Arial"/>
             </a:endParaRPr>
           </a:p>
@@ -478,11 +594,12 @@
           </a:prstGeom>
         </p:spPr>
         <p:txBody>
-          <a:bodyPr lIns="0" rIns="0" tIns="0" bIns="0">
+          <a:bodyPr lIns="0" tIns="0" rIns="0" bIns="0">
             <a:normAutofit/>
           </a:bodyPr>
-          <a:p>
-            <a:endParaRPr b="0" lang="fr-FR" sz="3200" spc="-1" strike="noStrike">
+          <a:lstStyle/>
+          <a:p>
+            <a:endParaRPr lang="fr-FR" sz="3200" b="0" strike="noStrike" spc="-1">
               <a:latin typeface="Arial"/>
             </a:endParaRPr>
           </a:p>
@@ -508,11 +625,12 @@
           </a:prstGeom>
         </p:spPr>
         <p:txBody>
-          <a:bodyPr lIns="0" rIns="0" tIns="0" bIns="0">
+          <a:bodyPr lIns="0" tIns="0" rIns="0" bIns="0">
             <a:normAutofit/>
           </a:bodyPr>
-          <a:p>
-            <a:endParaRPr b="0" lang="fr-FR" sz="3200" spc="-1" strike="noStrike">
+          <a:lstStyle/>
+          <a:p>
+            <a:endParaRPr lang="fr-FR" sz="3200" b="0" strike="noStrike" spc="-1">
               <a:latin typeface="Arial"/>
             </a:endParaRPr>
           </a:p>
@@ -538,11 +656,12 @@
           </a:prstGeom>
         </p:spPr>
         <p:txBody>
-          <a:bodyPr lIns="0" rIns="0" tIns="0" bIns="0">
+          <a:bodyPr lIns="0" tIns="0" rIns="0" bIns="0">
             <a:normAutofit/>
           </a:bodyPr>
-          <a:p>
-            <a:endParaRPr b="0" lang="fr-FR" sz="3200" spc="-1" strike="noStrike">
+          <a:lstStyle/>
+          <a:p>
+            <a:endParaRPr lang="fr-FR" sz="3200" b="0" strike="noStrike" spc="-1">
               <a:latin typeface="Arial"/>
             </a:endParaRPr>
           </a:p>
@@ -550,11 +669,14 @@
       </p:sp>
     </p:spTree>
   </p:cSld>
+  <p:clrMapOvr>
+    <a:masterClrMapping/>
+  </p:clrMapOvr>
 </p:sldLayout>
 </file>
 
 <file path=ppt/slideLayouts/slideLayout2.xml><?xml version="1.0" encoding="utf-8"?>
-<p:sldLayout xmlns:a="http://schemas.openxmlformats.org/drawingml/2006/main" xmlns:p="http://schemas.openxmlformats.org/presentationml/2006/main" xmlns:r="http://schemas.openxmlformats.org/officeDocument/2006/relationships" xmlns:p14="http://schemas.microsoft.com/office/powerpoint/2010/main" xmlns:p15="http://schemas.microsoft.com/office/powerpoint/2012/main" xmlns:mc="http://schemas.openxmlformats.org/markup-compatibility/2006" type="tx" preserve="1">
+<p:sldLayout xmlns:a="http://schemas.openxmlformats.org/drawingml/2006/main" xmlns:r="http://schemas.openxmlformats.org/officeDocument/2006/relationships" xmlns:p="http://schemas.openxmlformats.org/presentationml/2006/main" type="tx" preserve="1">
   <p:cSld name="Title Slide">
     <p:spTree>
       <p:nvGrpSpPr>
@@ -590,12 +712,13 @@
           </a:prstGeom>
         </p:spPr>
         <p:txBody>
-          <a:bodyPr lIns="0" rIns="0" tIns="0" bIns="0" anchor="ctr">
+          <a:bodyPr lIns="0" tIns="0" rIns="0" bIns="0" anchor="ctr">
             <a:spAutoFit/>
           </a:bodyPr>
+          <a:lstStyle/>
           <a:p>
             <a:pPr algn="ctr"/>
-            <a:endParaRPr b="0" lang="fr-FR" sz="4400" spc="-1" strike="noStrike">
+            <a:endParaRPr lang="fr-FR" sz="4400" b="0" strike="noStrike" spc="-1">
               <a:latin typeface="Arial"/>
             </a:endParaRPr>
           </a:p>
@@ -621,12 +744,13 @@
           </a:prstGeom>
         </p:spPr>
         <p:txBody>
-          <a:bodyPr lIns="0" rIns="0" tIns="0" bIns="0" anchor="ctr">
+          <a:bodyPr lIns="0" tIns="0" rIns="0" bIns="0" anchor="ctr">
             <a:spAutoFit/>
           </a:bodyPr>
+          <a:lstStyle/>
           <a:p>
             <a:pPr algn="ctr"/>
-            <a:endParaRPr b="0" lang="fr-FR" sz="3200" spc="-1" strike="noStrike">
+            <a:endParaRPr lang="fr-FR" sz="3200" b="0" strike="noStrike" spc="-1">
               <a:latin typeface="Arial"/>
             </a:endParaRPr>
           </a:p>
@@ -634,11 +758,14 @@
       </p:sp>
     </p:spTree>
   </p:cSld>
+  <p:clrMapOvr>
+    <a:masterClrMapping/>
+  </p:clrMapOvr>
 </p:sldLayout>
 </file>
 
 <file path=ppt/slideLayouts/slideLayout3.xml><?xml version="1.0" encoding="utf-8"?>
-<p:sldLayout xmlns:a="http://schemas.openxmlformats.org/drawingml/2006/main" xmlns:p="http://schemas.openxmlformats.org/presentationml/2006/main" xmlns:r="http://schemas.openxmlformats.org/officeDocument/2006/relationships" xmlns:p14="http://schemas.microsoft.com/office/powerpoint/2010/main" xmlns:p15="http://schemas.microsoft.com/office/powerpoint/2012/main" xmlns:mc="http://schemas.openxmlformats.org/markup-compatibility/2006" type="obj" preserve="1">
+<p:sldLayout xmlns:a="http://schemas.openxmlformats.org/drawingml/2006/main" xmlns:r="http://schemas.openxmlformats.org/officeDocument/2006/relationships" xmlns:p="http://schemas.openxmlformats.org/presentationml/2006/main" type="obj" preserve="1">
   <p:cSld name="Title, Content">
     <p:spTree>
       <p:nvGrpSpPr>
@@ -674,12 +801,13 @@
           </a:prstGeom>
         </p:spPr>
         <p:txBody>
-          <a:bodyPr lIns="0" rIns="0" tIns="0" bIns="0" anchor="ctr">
+          <a:bodyPr lIns="0" tIns="0" rIns="0" bIns="0" anchor="ctr">
             <a:spAutoFit/>
           </a:bodyPr>
+          <a:lstStyle/>
           <a:p>
             <a:pPr algn="ctr"/>
-            <a:endParaRPr b="0" lang="fr-FR" sz="4400" spc="-1" strike="noStrike">
+            <a:endParaRPr lang="fr-FR" sz="4400" b="0" strike="noStrike" spc="-1">
               <a:latin typeface="Arial"/>
             </a:endParaRPr>
           </a:p>
@@ -705,11 +833,12 @@
           </a:prstGeom>
         </p:spPr>
         <p:txBody>
-          <a:bodyPr lIns="0" rIns="0" tIns="0" bIns="0">
+          <a:bodyPr lIns="0" tIns="0" rIns="0" bIns="0">
             <a:normAutofit/>
           </a:bodyPr>
-          <a:p>
-            <a:endParaRPr b="0" lang="fr-FR" sz="3200" spc="-1" strike="noStrike">
+          <a:lstStyle/>
+          <a:p>
+            <a:endParaRPr lang="fr-FR" sz="3200" b="0" strike="noStrike" spc="-1">
               <a:latin typeface="Arial"/>
             </a:endParaRPr>
           </a:p>
@@ -717,11 +846,14 @@
       </p:sp>
     </p:spTree>
   </p:cSld>
+  <p:clrMapOvr>
+    <a:masterClrMapping/>
+  </p:clrMapOvr>
 </p:sldLayout>
 </file>
 
 <file path=ppt/slideLayouts/slideLayout4.xml><?xml version="1.0" encoding="utf-8"?>
-<p:sldLayout xmlns:a="http://schemas.openxmlformats.org/drawingml/2006/main" xmlns:p="http://schemas.openxmlformats.org/presentationml/2006/main" xmlns:r="http://schemas.openxmlformats.org/officeDocument/2006/relationships" xmlns:p14="http://schemas.microsoft.com/office/powerpoint/2010/main" xmlns:p15="http://schemas.microsoft.com/office/powerpoint/2012/main" xmlns:mc="http://schemas.openxmlformats.org/markup-compatibility/2006" type="twoObj" preserve="1">
+<p:sldLayout xmlns:a="http://schemas.openxmlformats.org/drawingml/2006/main" xmlns:r="http://schemas.openxmlformats.org/officeDocument/2006/relationships" xmlns:p="http://schemas.openxmlformats.org/presentationml/2006/main" type="twoObj" preserve="1">
   <p:cSld name="Title, 2 Content">
     <p:spTree>
       <p:nvGrpSpPr>
@@ -757,12 +889,13 @@
           </a:prstGeom>
         </p:spPr>
         <p:txBody>
-          <a:bodyPr lIns="0" rIns="0" tIns="0" bIns="0" anchor="ctr">
+          <a:bodyPr lIns="0" tIns="0" rIns="0" bIns="0" anchor="ctr">
             <a:spAutoFit/>
           </a:bodyPr>
+          <a:lstStyle/>
           <a:p>
             <a:pPr algn="ctr"/>
-            <a:endParaRPr b="0" lang="fr-FR" sz="4400" spc="-1" strike="noStrike">
+            <a:endParaRPr lang="fr-FR" sz="4400" b="0" strike="noStrike" spc="-1">
               <a:latin typeface="Arial"/>
             </a:endParaRPr>
           </a:p>
@@ -788,11 +921,12 @@
           </a:prstGeom>
         </p:spPr>
         <p:txBody>
-          <a:bodyPr lIns="0" rIns="0" tIns="0" bIns="0">
+          <a:bodyPr lIns="0" tIns="0" rIns="0" bIns="0">
             <a:normAutofit/>
           </a:bodyPr>
-          <a:p>
-            <a:endParaRPr b="0" lang="fr-FR" sz="3200" spc="-1" strike="noStrike">
+          <a:lstStyle/>
+          <a:p>
+            <a:endParaRPr lang="fr-FR" sz="3200" b="0" strike="noStrike" spc="-1">
               <a:latin typeface="Arial"/>
             </a:endParaRPr>
           </a:p>
@@ -818,11 +952,12 @@
           </a:prstGeom>
         </p:spPr>
         <p:txBody>
-          <a:bodyPr lIns="0" rIns="0" tIns="0" bIns="0">
+          <a:bodyPr lIns="0" tIns="0" rIns="0" bIns="0">
             <a:normAutofit/>
           </a:bodyPr>
-          <a:p>
-            <a:endParaRPr b="0" lang="fr-FR" sz="3200" spc="-1" strike="noStrike">
+          <a:lstStyle/>
+          <a:p>
+            <a:endParaRPr lang="fr-FR" sz="3200" b="0" strike="noStrike" spc="-1">
               <a:latin typeface="Arial"/>
             </a:endParaRPr>
           </a:p>
@@ -830,11 +965,14 @@
       </p:sp>
     </p:spTree>
   </p:cSld>
+  <p:clrMapOvr>
+    <a:masterClrMapping/>
+  </p:clrMapOvr>
 </p:sldLayout>
 </file>
 
 <file path=ppt/slideLayouts/slideLayout5.xml><?xml version="1.0" encoding="utf-8"?>
-<p:sldLayout xmlns:a="http://schemas.openxmlformats.org/drawingml/2006/main" xmlns:p="http://schemas.openxmlformats.org/presentationml/2006/main" xmlns:r="http://schemas.openxmlformats.org/officeDocument/2006/relationships" xmlns:p14="http://schemas.microsoft.com/office/powerpoint/2010/main" xmlns:p15="http://schemas.microsoft.com/office/powerpoint/2012/main" xmlns:mc="http://schemas.openxmlformats.org/markup-compatibility/2006" type="titleOnly" preserve="1">
+<p:sldLayout xmlns:a="http://schemas.openxmlformats.org/drawingml/2006/main" xmlns:r="http://schemas.openxmlformats.org/officeDocument/2006/relationships" xmlns:p="http://schemas.openxmlformats.org/presentationml/2006/main" type="titleOnly" preserve="1">
   <p:cSld name="Title Only">
     <p:spTree>
       <p:nvGrpSpPr>
@@ -870,12 +1008,13 @@
           </a:prstGeom>
         </p:spPr>
         <p:txBody>
-          <a:bodyPr lIns="0" rIns="0" tIns="0" bIns="0" anchor="ctr">
+          <a:bodyPr lIns="0" tIns="0" rIns="0" bIns="0" anchor="ctr">
             <a:spAutoFit/>
           </a:bodyPr>
+          <a:lstStyle/>
           <a:p>
             <a:pPr algn="ctr"/>
-            <a:endParaRPr b="0" lang="fr-FR" sz="4400" spc="-1" strike="noStrike">
+            <a:endParaRPr lang="fr-FR" sz="4400" b="0" strike="noStrike" spc="-1">
               <a:latin typeface="Arial"/>
             </a:endParaRPr>
           </a:p>
@@ -883,11 +1022,14 @@
       </p:sp>
     </p:spTree>
   </p:cSld>
+  <p:clrMapOvr>
+    <a:masterClrMapping/>
+  </p:clrMapOvr>
 </p:sldLayout>
 </file>
 
 <file path=ppt/slideLayouts/slideLayout6.xml><?xml version="1.0" encoding="utf-8"?>
-<p:sldLayout xmlns:a="http://schemas.openxmlformats.org/drawingml/2006/main" xmlns:p="http://schemas.openxmlformats.org/presentationml/2006/main" xmlns:r="http://schemas.openxmlformats.org/officeDocument/2006/relationships" xmlns:p14="http://schemas.microsoft.com/office/powerpoint/2010/main" xmlns:p15="http://schemas.microsoft.com/office/powerpoint/2012/main" xmlns:mc="http://schemas.openxmlformats.org/markup-compatibility/2006" type="objOnly" preserve="1">
+<p:sldLayout xmlns:a="http://schemas.openxmlformats.org/drawingml/2006/main" xmlns:r="http://schemas.openxmlformats.org/officeDocument/2006/relationships" xmlns:p="http://schemas.openxmlformats.org/presentationml/2006/main" type="objOnly" preserve="1">
   <p:cSld name="Centered Text">
     <p:spTree>
       <p:nvGrpSpPr>
@@ -923,12 +1065,13 @@
           </a:prstGeom>
         </p:spPr>
         <p:txBody>
-          <a:bodyPr lIns="0" rIns="0" tIns="0" bIns="0" anchor="ctr">
+          <a:bodyPr lIns="0" tIns="0" rIns="0" bIns="0" anchor="ctr">
             <a:spAutoFit/>
           </a:bodyPr>
+          <a:lstStyle/>
           <a:p>
             <a:pPr algn="ctr"/>
-            <a:endParaRPr b="0" lang="fr-FR" sz="3200" spc="-1" strike="noStrike">
+            <a:endParaRPr lang="fr-FR" sz="3200" b="0" strike="noStrike" spc="-1">
               <a:latin typeface="Arial"/>
             </a:endParaRPr>
           </a:p>
@@ -936,11 +1079,14 @@
       </p:sp>
     </p:spTree>
   </p:cSld>
+  <p:clrMapOvr>
+    <a:masterClrMapping/>
+  </p:clrMapOvr>
 </p:sldLayout>
 </file>
 
 <file path=ppt/slideLayouts/slideLayout7.xml><?xml version="1.0" encoding="utf-8"?>
-<p:sldLayout xmlns:a="http://schemas.openxmlformats.org/drawingml/2006/main" xmlns:p="http://schemas.openxmlformats.org/presentationml/2006/main" xmlns:r="http://schemas.openxmlformats.org/officeDocument/2006/relationships" xmlns:p14="http://schemas.microsoft.com/office/powerpoint/2010/main" xmlns:p15="http://schemas.microsoft.com/office/powerpoint/2012/main" xmlns:mc="http://schemas.openxmlformats.org/markup-compatibility/2006" type="twoObjAndObj" preserve="1">
+<p:sldLayout xmlns:a="http://schemas.openxmlformats.org/drawingml/2006/main" xmlns:r="http://schemas.openxmlformats.org/officeDocument/2006/relationships" xmlns:p="http://schemas.openxmlformats.org/presentationml/2006/main" type="twoObjAndObj" preserve="1">
   <p:cSld name="Title, 2 Content and Content">
     <p:spTree>
       <p:nvGrpSpPr>
@@ -976,12 +1122,13 @@
           </a:prstGeom>
         </p:spPr>
         <p:txBody>
-          <a:bodyPr lIns="0" rIns="0" tIns="0" bIns="0" anchor="ctr">
+          <a:bodyPr lIns="0" tIns="0" rIns="0" bIns="0" anchor="ctr">
             <a:spAutoFit/>
           </a:bodyPr>
+          <a:lstStyle/>
           <a:p>
             <a:pPr algn="ctr"/>
-            <a:endParaRPr b="0" lang="fr-FR" sz="4400" spc="-1" strike="noStrike">
+            <a:endParaRPr lang="fr-FR" sz="4400" b="0" strike="noStrike" spc="-1">
               <a:latin typeface="Arial"/>
             </a:endParaRPr>
           </a:p>
@@ -1007,11 +1154,12 @@
           </a:prstGeom>
         </p:spPr>
         <p:txBody>
-          <a:bodyPr lIns="0" rIns="0" tIns="0" bIns="0">
+          <a:bodyPr lIns="0" tIns="0" rIns="0" bIns="0">
             <a:normAutofit/>
           </a:bodyPr>
-          <a:p>
-            <a:endParaRPr b="0" lang="fr-FR" sz="3200" spc="-1" strike="noStrike">
+          <a:lstStyle/>
+          <a:p>
+            <a:endParaRPr lang="fr-FR" sz="3200" b="0" strike="noStrike" spc="-1">
               <a:latin typeface="Arial"/>
             </a:endParaRPr>
           </a:p>
@@ -1037,11 +1185,12 @@
           </a:prstGeom>
         </p:spPr>
         <p:txBody>
-          <a:bodyPr lIns="0" rIns="0" tIns="0" bIns="0">
+          <a:bodyPr lIns="0" tIns="0" rIns="0" bIns="0">
             <a:normAutofit/>
           </a:bodyPr>
-          <a:p>
-            <a:endParaRPr b="0" lang="fr-FR" sz="3200" spc="-1" strike="noStrike">
+          <a:lstStyle/>
+          <a:p>
+            <a:endParaRPr lang="fr-FR" sz="3200" b="0" strike="noStrike" spc="-1">
               <a:latin typeface="Arial"/>
             </a:endParaRPr>
           </a:p>
@@ -1067,11 +1216,12 @@
           </a:prstGeom>
         </p:spPr>
         <p:txBody>
-          <a:bodyPr lIns="0" rIns="0" tIns="0" bIns="0">
+          <a:bodyPr lIns="0" tIns="0" rIns="0" bIns="0">
             <a:normAutofit/>
           </a:bodyPr>
-          <a:p>
-            <a:endParaRPr b="0" lang="fr-FR" sz="3200" spc="-1" strike="noStrike">
+          <a:lstStyle/>
+          <a:p>
+            <a:endParaRPr lang="fr-FR" sz="3200" b="0" strike="noStrike" spc="-1">
               <a:latin typeface="Arial"/>
             </a:endParaRPr>
           </a:p>
@@ -1079,11 +1229,14 @@
       </p:sp>
     </p:spTree>
   </p:cSld>
+  <p:clrMapOvr>
+    <a:masterClrMapping/>
+  </p:clrMapOvr>
 </p:sldLayout>
 </file>
 
 <file path=ppt/slideLayouts/slideLayout8.xml><?xml version="1.0" encoding="utf-8"?>
-<p:sldLayout xmlns:a="http://schemas.openxmlformats.org/drawingml/2006/main" xmlns:p="http://schemas.openxmlformats.org/presentationml/2006/main" xmlns:r="http://schemas.openxmlformats.org/officeDocument/2006/relationships" xmlns:p14="http://schemas.microsoft.com/office/powerpoint/2010/main" xmlns:p15="http://schemas.microsoft.com/office/powerpoint/2012/main" xmlns:mc="http://schemas.openxmlformats.org/markup-compatibility/2006" type="objAndTwoObj" preserve="1">
+<p:sldLayout xmlns:a="http://schemas.openxmlformats.org/drawingml/2006/main" xmlns:r="http://schemas.openxmlformats.org/officeDocument/2006/relationships" xmlns:p="http://schemas.openxmlformats.org/presentationml/2006/main" type="objAndTwoObj" preserve="1">
   <p:cSld name="Title Content and 2 Content">
     <p:spTree>
       <p:nvGrpSpPr>
@@ -1119,12 +1272,13 @@
           </a:prstGeom>
         </p:spPr>
         <p:txBody>
-          <a:bodyPr lIns="0" rIns="0" tIns="0" bIns="0" anchor="ctr">
+          <a:bodyPr lIns="0" tIns="0" rIns="0" bIns="0" anchor="ctr">
             <a:spAutoFit/>
           </a:bodyPr>
+          <a:lstStyle/>
           <a:p>
             <a:pPr algn="ctr"/>
-            <a:endParaRPr b="0" lang="fr-FR" sz="4400" spc="-1" strike="noStrike">
+            <a:endParaRPr lang="fr-FR" sz="4400" b="0" strike="noStrike" spc="-1">
               <a:latin typeface="Arial"/>
             </a:endParaRPr>
           </a:p>
@@ -1150,11 +1304,12 @@
           </a:prstGeom>
         </p:spPr>
         <p:txBody>
-          <a:bodyPr lIns="0" rIns="0" tIns="0" bIns="0">
+          <a:bodyPr lIns="0" tIns="0" rIns="0" bIns="0">
             <a:normAutofit/>
           </a:bodyPr>
-          <a:p>
-            <a:endParaRPr b="0" lang="fr-FR" sz="3200" spc="-1" strike="noStrike">
+          <a:lstStyle/>
+          <a:p>
+            <a:endParaRPr lang="fr-FR" sz="3200" b="0" strike="noStrike" spc="-1">
               <a:latin typeface="Arial"/>
             </a:endParaRPr>
           </a:p>
@@ -1180,11 +1335,12 @@
           </a:prstGeom>
         </p:spPr>
         <p:txBody>
-          <a:bodyPr lIns="0" rIns="0" tIns="0" bIns="0">
+          <a:bodyPr lIns="0" tIns="0" rIns="0" bIns="0">
             <a:normAutofit/>
           </a:bodyPr>
-          <a:p>
-            <a:endParaRPr b="0" lang="fr-FR" sz="3200" spc="-1" strike="noStrike">
+          <a:lstStyle/>
+          <a:p>
+            <a:endParaRPr lang="fr-FR" sz="3200" b="0" strike="noStrike" spc="-1">
               <a:latin typeface="Arial"/>
             </a:endParaRPr>
           </a:p>
@@ -1210,11 +1366,12 @@
           </a:prstGeom>
         </p:spPr>
         <p:txBody>
-          <a:bodyPr lIns="0" rIns="0" tIns="0" bIns="0">
+          <a:bodyPr lIns="0" tIns="0" rIns="0" bIns="0">
             <a:normAutofit/>
           </a:bodyPr>
-          <a:p>
-            <a:endParaRPr b="0" lang="fr-FR" sz="3200" spc="-1" strike="noStrike">
+          <a:lstStyle/>
+          <a:p>
+            <a:endParaRPr lang="fr-FR" sz="3200" b="0" strike="noStrike" spc="-1">
               <a:latin typeface="Arial"/>
             </a:endParaRPr>
           </a:p>
@@ -1222,11 +1379,14 @@
       </p:sp>
     </p:spTree>
   </p:cSld>
+  <p:clrMapOvr>
+    <a:masterClrMapping/>
+  </p:clrMapOvr>
 </p:sldLayout>
 </file>
 
 <file path=ppt/slideLayouts/slideLayout9.xml><?xml version="1.0" encoding="utf-8"?>
-<p:sldLayout xmlns:a="http://schemas.openxmlformats.org/drawingml/2006/main" xmlns:p="http://schemas.openxmlformats.org/presentationml/2006/main" xmlns:r="http://schemas.openxmlformats.org/officeDocument/2006/relationships" xmlns:p14="http://schemas.microsoft.com/office/powerpoint/2010/main" xmlns:p15="http://schemas.microsoft.com/office/powerpoint/2012/main" xmlns:mc="http://schemas.openxmlformats.org/markup-compatibility/2006" type="twoObjOverTx" preserve="1">
+<p:sldLayout xmlns:a="http://schemas.openxmlformats.org/drawingml/2006/main" xmlns:r="http://schemas.openxmlformats.org/officeDocument/2006/relationships" xmlns:p="http://schemas.openxmlformats.org/presentationml/2006/main" type="twoObjOverTx" preserve="1">
   <p:cSld name="Title, 2 Content over Content">
     <p:spTree>
       <p:nvGrpSpPr>
@@ -1262,12 +1422,13 @@
           </a:prstGeom>
         </p:spPr>
         <p:txBody>
-          <a:bodyPr lIns="0" rIns="0" tIns="0" bIns="0" anchor="ctr">
+          <a:bodyPr lIns="0" tIns="0" rIns="0" bIns="0" anchor="ctr">
             <a:spAutoFit/>
           </a:bodyPr>
+          <a:lstStyle/>
           <a:p>
             <a:pPr algn="ctr"/>
-            <a:endParaRPr b="0" lang="fr-FR" sz="4400" spc="-1" strike="noStrike">
+            <a:endParaRPr lang="fr-FR" sz="4400" b="0" strike="noStrike" spc="-1">
               <a:latin typeface="Arial"/>
             </a:endParaRPr>
           </a:p>
@@ -1293,11 +1454,12 @@
           </a:prstGeom>
         </p:spPr>
         <p:txBody>
-          <a:bodyPr lIns="0" rIns="0" tIns="0" bIns="0">
+          <a:bodyPr lIns="0" tIns="0" rIns="0" bIns="0">
             <a:normAutofit/>
           </a:bodyPr>
-          <a:p>
-            <a:endParaRPr b="0" lang="fr-FR" sz="3200" spc="-1" strike="noStrike">
+          <a:lstStyle/>
+          <a:p>
+            <a:endParaRPr lang="fr-FR" sz="3200" b="0" strike="noStrike" spc="-1">
               <a:latin typeface="Arial"/>
             </a:endParaRPr>
           </a:p>
@@ -1323,11 +1485,12 @@
           </a:prstGeom>
         </p:spPr>
         <p:txBody>
-          <a:bodyPr lIns="0" rIns="0" tIns="0" bIns="0">
+          <a:bodyPr lIns="0" tIns="0" rIns="0" bIns="0">
             <a:normAutofit/>
           </a:bodyPr>
-          <a:p>
-            <a:endParaRPr b="0" lang="fr-FR" sz="3200" spc="-1" strike="noStrike">
+          <a:lstStyle/>
+          <a:p>
+            <a:endParaRPr lang="fr-FR" sz="3200" b="0" strike="noStrike" spc="-1">
               <a:latin typeface="Arial"/>
             </a:endParaRPr>
           </a:p>
@@ -1353,11 +1516,12 @@
           </a:prstGeom>
         </p:spPr>
         <p:txBody>
-          <a:bodyPr lIns="0" rIns="0" tIns="0" bIns="0">
+          <a:bodyPr lIns="0" tIns="0" rIns="0" bIns="0">
             <a:normAutofit/>
           </a:bodyPr>
-          <a:p>
-            <a:endParaRPr b="0" lang="fr-FR" sz="3200" spc="-1" strike="noStrike">
+          <a:lstStyle/>
+          <a:p>
+            <a:endParaRPr lang="fr-FR" sz="3200" b="0" strike="noStrike" spc="-1">
               <a:latin typeface="Arial"/>
             </a:endParaRPr>
           </a:p>
@@ -1365,17 +1529,21 @@
       </p:sp>
     </p:spTree>
   </p:cSld>
+  <p:clrMapOvr>
+    <a:masterClrMapping/>
+  </p:clrMapOvr>
 </p:sldLayout>
 </file>
 
 <file path=ppt/slideMasters/slideMaster1.xml><?xml version="1.0" encoding="utf-8"?>
-<p:sldMaster xmlns:a="http://schemas.openxmlformats.org/drawingml/2006/main" xmlns:p="http://schemas.openxmlformats.org/presentationml/2006/main" xmlns:r="http://schemas.openxmlformats.org/officeDocument/2006/relationships" xmlns:p14="http://schemas.microsoft.com/office/powerpoint/2010/main" xmlns:p15="http://schemas.microsoft.com/office/powerpoint/2012/main" xmlns:mc="http://schemas.openxmlformats.org/markup-compatibility/2006">
+<p:sldMaster xmlns:a="http://schemas.openxmlformats.org/drawingml/2006/main" xmlns:r="http://schemas.openxmlformats.org/officeDocument/2006/relationships" xmlns:p="http://schemas.openxmlformats.org/presentationml/2006/main">
   <p:cSld>
     <p:bg>
       <p:bgPr>
         <a:solidFill>
-          <a:srgbClr val="ffffff"/>
+          <a:srgbClr val="FFFFFF"/>
         </a:solidFill>
+        <a:effectLst/>
       </p:bgPr>
     </p:bg>
     <p:spTree>
@@ -1394,7 +1562,7 @@
       </p:grpSpPr>
       <p:sp>
         <p:nvSpPr>
-          <p:cNvPr id="0" name="PlaceHolder 1"/>
+          <p:cNvPr id="2" name="PlaceHolder 1"/>
           <p:cNvSpPr>
             <a:spLocks noGrp="1"/>
           </p:cNvSpPr>
@@ -1412,26 +1580,24 @@
           </a:prstGeom>
         </p:spPr>
         <p:txBody>
-          <a:bodyPr lIns="0" rIns="0" tIns="0" bIns="0" anchor="ctr">
+          <a:bodyPr lIns="0" tIns="0" rIns="0" bIns="0" anchor="ctr">
             <a:noAutofit/>
           </a:bodyPr>
+          <a:lstStyle/>
           <a:p>
             <a:pPr algn="ctr"/>
             <a:r>
-              <a:rPr b="0" lang="fr-FR" sz="4400" spc="-1" strike="noStrike">
+              <a:rPr lang="fr-FR" sz="4400" b="0" strike="noStrike" spc="-1">
                 <a:latin typeface="Arial"/>
               </a:rPr>
               <a:t>Cliquez pour éditer le format du texte-titre</a:t>
             </a:r>
-            <a:endParaRPr b="0" lang="fr-FR" sz="4400" spc="-1" strike="noStrike">
-              <a:latin typeface="Arial"/>
-            </a:endParaRPr>
-          </a:p>
-        </p:txBody>
-      </p:sp>
-      <p:sp>
-        <p:nvSpPr>
-          <p:cNvPr id="1" name="PlaceHolder 2"/>
+          </a:p>
+        </p:txBody>
+      </p:sp>
+      <p:sp>
+        <p:nvSpPr>
+          <p:cNvPr id="3" name="PlaceHolder 2"/>
           <p:cNvSpPr>
             <a:spLocks noGrp="1"/>
           </p:cNvSpPr>
@@ -1449,9 +1615,10 @@
           </a:prstGeom>
         </p:spPr>
         <p:txBody>
-          <a:bodyPr lIns="0" rIns="0" tIns="0" bIns="0">
+          <a:bodyPr lIns="0" tIns="0" rIns="0" bIns="0">
             <a:normAutofit/>
           </a:bodyPr>
+          <a:lstStyle/>
           <a:p>
             <a:pPr marL="432000" indent="-324000">
               <a:spcBef>
@@ -1465,17 +1632,14 @@
               <a:buChar char=""/>
             </a:pPr>
             <a:r>
-              <a:rPr b="0" lang="fr-FR" sz="3200" spc="-1" strike="noStrike">
+              <a:rPr lang="fr-FR" sz="3200" b="0" strike="noStrike" spc="-1">
                 <a:latin typeface="Arial"/>
               </a:rPr>
               <a:t>Cliquez pour éditer le format du plan de texte</a:t>
             </a:r>
-            <a:endParaRPr b="0" lang="fr-FR" sz="3200" spc="-1" strike="noStrike">
-              <a:latin typeface="Arial"/>
-            </a:endParaRPr>
-          </a:p>
-          <a:p>
-            <a:pPr lvl="1" marL="864000" indent="-324000">
+          </a:p>
+          <a:p>
+            <a:pPr marL="864000" lvl="1" indent="-324000">
               <a:spcBef>
                 <a:spcPts val="1134"/>
               </a:spcBef>
@@ -1487,17 +1651,14 @@
               <a:buChar char=""/>
             </a:pPr>
             <a:r>
-              <a:rPr b="0" lang="fr-FR" sz="2800" spc="-1" strike="noStrike">
+              <a:rPr lang="fr-FR" sz="2800" b="0" strike="noStrike" spc="-1">
                 <a:latin typeface="Arial"/>
               </a:rPr>
               <a:t>Second niveau de plan</a:t>
             </a:r>
-            <a:endParaRPr b="0" lang="fr-FR" sz="2800" spc="-1" strike="noStrike">
-              <a:latin typeface="Arial"/>
-            </a:endParaRPr>
-          </a:p>
-          <a:p>
-            <a:pPr lvl="2" marL="1296000" indent="-288000">
+          </a:p>
+          <a:p>
+            <a:pPr marL="1296000" lvl="2" indent="-288000">
               <a:spcBef>
                 <a:spcPts val="850"/>
               </a:spcBef>
@@ -1509,17 +1670,14 @@
               <a:buChar char=""/>
             </a:pPr>
             <a:r>
-              <a:rPr b="0" lang="fr-FR" sz="2400" spc="-1" strike="noStrike">
+              <a:rPr lang="fr-FR" sz="2400" b="0" strike="noStrike" spc="-1">
                 <a:latin typeface="Arial"/>
               </a:rPr>
               <a:t>Troisième niveau de plan</a:t>
             </a:r>
-            <a:endParaRPr b="0" lang="fr-FR" sz="2400" spc="-1" strike="noStrike">
-              <a:latin typeface="Arial"/>
-            </a:endParaRPr>
-          </a:p>
-          <a:p>
-            <a:pPr lvl="3" marL="1728000" indent="-216000">
+          </a:p>
+          <a:p>
+            <a:pPr marL="1728000" lvl="3" indent="-216000">
               <a:spcBef>
                 <a:spcPts val="567"/>
               </a:spcBef>
@@ -1531,17 +1689,14 @@
               <a:buChar char=""/>
             </a:pPr>
             <a:r>
-              <a:rPr b="0" lang="fr-FR" sz="2000" spc="-1" strike="noStrike">
+              <a:rPr lang="fr-FR" sz="2000" b="0" strike="noStrike" spc="-1">
                 <a:latin typeface="Arial"/>
               </a:rPr>
               <a:t>Quatrième niveau de plan</a:t>
             </a:r>
-            <a:endParaRPr b="0" lang="fr-FR" sz="2000" spc="-1" strike="noStrike">
-              <a:latin typeface="Arial"/>
-            </a:endParaRPr>
-          </a:p>
-          <a:p>
-            <a:pPr lvl="4" marL="2160000" indent="-216000">
+          </a:p>
+          <a:p>
+            <a:pPr marL="2160000" lvl="4" indent="-216000">
               <a:spcBef>
                 <a:spcPts val="283"/>
               </a:spcBef>
@@ -1553,17 +1708,14 @@
               <a:buChar char=""/>
             </a:pPr>
             <a:r>
-              <a:rPr b="0" lang="fr-FR" sz="2000" spc="-1" strike="noStrike">
+              <a:rPr lang="fr-FR" sz="2000" b="0" strike="noStrike" spc="-1">
                 <a:latin typeface="Arial"/>
               </a:rPr>
               <a:t>Cinquième niveau de plan</a:t>
             </a:r>
-            <a:endParaRPr b="0" lang="fr-FR" sz="2000" spc="-1" strike="noStrike">
-              <a:latin typeface="Arial"/>
-            </a:endParaRPr>
-          </a:p>
-          <a:p>
-            <a:pPr lvl="5" marL="2592000" indent="-216000">
+          </a:p>
+          <a:p>
+            <a:pPr marL="2592000" lvl="5" indent="-216000">
               <a:spcBef>
                 <a:spcPts val="283"/>
               </a:spcBef>
@@ -1575,17 +1727,14 @@
               <a:buChar char=""/>
             </a:pPr>
             <a:r>
-              <a:rPr b="0" lang="fr-FR" sz="2000" spc="-1" strike="noStrike">
+              <a:rPr lang="fr-FR" sz="2000" b="0" strike="noStrike" spc="-1">
                 <a:latin typeface="Arial"/>
               </a:rPr>
               <a:t>Sixième niveau de plan</a:t>
             </a:r>
-            <a:endParaRPr b="0" lang="fr-FR" sz="2000" spc="-1" strike="noStrike">
-              <a:latin typeface="Arial"/>
-            </a:endParaRPr>
-          </a:p>
-          <a:p>
-            <a:pPr lvl="6" marL="3024000" indent="-216000">
+          </a:p>
+          <a:p>
+            <a:pPr marL="3024000" lvl="6" indent="-216000">
               <a:spcBef>
                 <a:spcPts val="283"/>
               </a:spcBef>
@@ -1597,39 +1746,316 @@
               <a:buChar char=""/>
             </a:pPr>
             <a:r>
-              <a:rPr b="0" lang="fr-FR" sz="2000" spc="-1" strike="noStrike">
+              <a:rPr lang="fr-FR" sz="2000" b="0" strike="noStrike" spc="-1">
                 <a:latin typeface="Arial"/>
               </a:rPr>
               <a:t>Septième niveau de plan</a:t>
             </a:r>
-            <a:endParaRPr b="0" lang="fr-FR" sz="2000" spc="-1" strike="noStrike">
-              <a:latin typeface="Arial"/>
-            </a:endParaRPr>
           </a:p>
         </p:txBody>
       </p:sp>
     </p:spTree>
   </p:cSld>
-  <p:clrMap bg1="lt1" bg2="lt2" tx1="dk1" tx2="dk2" accent1="accent1" accent2="accent2" accent3="accent3" accent4="accent4" accent5="accent5" accent6="accent6" hlink="hlink" folHlink="folHlink"/>
+  <p:clrMap bg1="lt1" tx1="dk1" bg2="lt2" tx2="dk2" accent1="accent1" accent2="accent2" accent3="accent3" accent4="accent4" accent5="accent5" accent6="accent6" hlink="hlink" folHlink="folHlink"/>
   <p:sldLayoutIdLst>
-    <p:sldLayoutId id="2147483649" r:id="rId2"/>
-    <p:sldLayoutId id="2147483650" r:id="rId3"/>
-    <p:sldLayoutId id="2147483651" r:id="rId4"/>
-    <p:sldLayoutId id="2147483652" r:id="rId5"/>
-    <p:sldLayoutId id="2147483653" r:id="rId6"/>
-    <p:sldLayoutId id="2147483654" r:id="rId7"/>
-    <p:sldLayoutId id="2147483655" r:id="rId8"/>
-    <p:sldLayoutId id="2147483656" r:id="rId9"/>
-    <p:sldLayoutId id="2147483657" r:id="rId10"/>
-    <p:sldLayoutId id="2147483658" r:id="rId11"/>
-    <p:sldLayoutId id="2147483659" r:id="rId12"/>
-    <p:sldLayoutId id="2147483660" r:id="rId13"/>
+    <p:sldLayoutId id="2147483649" r:id="rId1"/>
+    <p:sldLayoutId id="2147483650" r:id="rId2"/>
+    <p:sldLayoutId id="2147483651" r:id="rId3"/>
+    <p:sldLayoutId id="2147483652" r:id="rId4"/>
+    <p:sldLayoutId id="2147483653" r:id="rId5"/>
+    <p:sldLayoutId id="2147483654" r:id="rId6"/>
+    <p:sldLayoutId id="2147483655" r:id="rId7"/>
+    <p:sldLayoutId id="2147483656" r:id="rId8"/>
+    <p:sldLayoutId id="2147483657" r:id="rId9"/>
+    <p:sldLayoutId id="2147483658" r:id="rId10"/>
+    <p:sldLayoutId id="2147483659" r:id="rId11"/>
+    <p:sldLayoutId id="2147483660" r:id="rId12"/>
   </p:sldLayoutIdLst>
+  <p:txStyles>
+    <p:titleStyle>
+      <a:lvl1pPr algn="l" defTabSz="914400" rtl="0" eaLnBrk="1" latinLnBrk="0" hangingPunct="1">
+        <a:lnSpc>
+          <a:spcPct val="90000"/>
+        </a:lnSpc>
+        <a:spcBef>
+          <a:spcPct val="0"/>
+        </a:spcBef>
+        <a:buNone/>
+        <a:defRPr sz="4400" kern="1200">
+          <a:solidFill>
+            <a:schemeClr val="tx1"/>
+          </a:solidFill>
+          <a:latin typeface="+mj-lt"/>
+          <a:ea typeface="+mj-ea"/>
+          <a:cs typeface="+mj-cs"/>
+        </a:defRPr>
+      </a:lvl1pPr>
+    </p:titleStyle>
+    <p:bodyStyle>
+      <a:lvl1pPr marL="228600" indent="-228600" algn="l" defTabSz="914400" rtl="0" eaLnBrk="1" latinLnBrk="0" hangingPunct="1">
+        <a:lnSpc>
+          <a:spcPct val="90000"/>
+        </a:lnSpc>
+        <a:spcBef>
+          <a:spcPts val="1000"/>
+        </a:spcBef>
+        <a:buFont typeface="Arial" panose="020B0604020202020204" pitchFamily="34" charset="0"/>
+        <a:buChar char="•"/>
+        <a:defRPr sz="2800" kern="1200">
+          <a:solidFill>
+            <a:schemeClr val="tx1"/>
+          </a:solidFill>
+          <a:latin typeface="+mn-lt"/>
+          <a:ea typeface="+mn-ea"/>
+          <a:cs typeface="+mn-cs"/>
+        </a:defRPr>
+      </a:lvl1pPr>
+      <a:lvl2pPr marL="685800" indent="-228600" algn="l" defTabSz="914400" rtl="0" eaLnBrk="1" latinLnBrk="0" hangingPunct="1">
+        <a:lnSpc>
+          <a:spcPct val="90000"/>
+        </a:lnSpc>
+        <a:spcBef>
+          <a:spcPts val="500"/>
+        </a:spcBef>
+        <a:buFont typeface="Arial" panose="020B0604020202020204" pitchFamily="34" charset="0"/>
+        <a:buChar char="•"/>
+        <a:defRPr sz="2400" kern="1200">
+          <a:solidFill>
+            <a:schemeClr val="tx1"/>
+          </a:solidFill>
+          <a:latin typeface="+mn-lt"/>
+          <a:ea typeface="+mn-ea"/>
+          <a:cs typeface="+mn-cs"/>
+        </a:defRPr>
+      </a:lvl2pPr>
+      <a:lvl3pPr marL="1143000" indent="-228600" algn="l" defTabSz="914400" rtl="0" eaLnBrk="1" latinLnBrk="0" hangingPunct="1">
+        <a:lnSpc>
+          <a:spcPct val="90000"/>
+        </a:lnSpc>
+        <a:spcBef>
+          <a:spcPts val="500"/>
+        </a:spcBef>
+        <a:buFont typeface="Arial" panose="020B0604020202020204" pitchFamily="34" charset="0"/>
+        <a:buChar char="•"/>
+        <a:defRPr sz="2000" kern="1200">
+          <a:solidFill>
+            <a:schemeClr val="tx1"/>
+          </a:solidFill>
+          <a:latin typeface="+mn-lt"/>
+          <a:ea typeface="+mn-ea"/>
+          <a:cs typeface="+mn-cs"/>
+        </a:defRPr>
+      </a:lvl3pPr>
+      <a:lvl4pPr marL="1600200" indent="-228600" algn="l" defTabSz="914400" rtl="0" eaLnBrk="1" latinLnBrk="0" hangingPunct="1">
+        <a:lnSpc>
+          <a:spcPct val="90000"/>
+        </a:lnSpc>
+        <a:spcBef>
+          <a:spcPts val="500"/>
+        </a:spcBef>
+        <a:buFont typeface="Arial" panose="020B0604020202020204" pitchFamily="34" charset="0"/>
+        <a:buChar char="•"/>
+        <a:defRPr sz="1800" kern="1200">
+          <a:solidFill>
+            <a:schemeClr val="tx1"/>
+          </a:solidFill>
+          <a:latin typeface="+mn-lt"/>
+          <a:ea typeface="+mn-ea"/>
+          <a:cs typeface="+mn-cs"/>
+        </a:defRPr>
+      </a:lvl4pPr>
+      <a:lvl5pPr marL="2057400" indent="-228600" algn="l" defTabSz="914400" rtl="0" eaLnBrk="1" latinLnBrk="0" hangingPunct="1">
+        <a:lnSpc>
+          <a:spcPct val="90000"/>
+        </a:lnSpc>
+        <a:spcBef>
+          <a:spcPts val="500"/>
+        </a:spcBef>
+        <a:buFont typeface="Arial" panose="020B0604020202020204" pitchFamily="34" charset="0"/>
+        <a:buChar char="•"/>
+        <a:defRPr sz="1800" kern="1200">
+          <a:solidFill>
+            <a:schemeClr val="tx1"/>
+          </a:solidFill>
+          <a:latin typeface="+mn-lt"/>
+          <a:ea typeface="+mn-ea"/>
+          <a:cs typeface="+mn-cs"/>
+        </a:defRPr>
+      </a:lvl5pPr>
+      <a:lvl6pPr marL="2514600" indent="-228600" algn="l" defTabSz="914400" rtl="0" eaLnBrk="1" latinLnBrk="0" hangingPunct="1">
+        <a:lnSpc>
+          <a:spcPct val="90000"/>
+        </a:lnSpc>
+        <a:spcBef>
+          <a:spcPts val="500"/>
+        </a:spcBef>
+        <a:buFont typeface="Arial" panose="020B0604020202020204" pitchFamily="34" charset="0"/>
+        <a:buChar char="•"/>
+        <a:defRPr sz="1800" kern="1200">
+          <a:solidFill>
+            <a:schemeClr val="tx1"/>
+          </a:solidFill>
+          <a:latin typeface="+mn-lt"/>
+          <a:ea typeface="+mn-ea"/>
+          <a:cs typeface="+mn-cs"/>
+        </a:defRPr>
+      </a:lvl6pPr>
+      <a:lvl7pPr marL="2971800" indent="-228600" algn="l" defTabSz="914400" rtl="0" eaLnBrk="1" latinLnBrk="0" hangingPunct="1">
+        <a:lnSpc>
+          <a:spcPct val="90000"/>
+        </a:lnSpc>
+        <a:spcBef>
+          <a:spcPts val="500"/>
+        </a:spcBef>
+        <a:buFont typeface="Arial" panose="020B0604020202020204" pitchFamily="34" charset="0"/>
+        <a:buChar char="•"/>
+        <a:defRPr sz="1800" kern="1200">
+          <a:solidFill>
+            <a:schemeClr val="tx1"/>
+          </a:solidFill>
+          <a:latin typeface="+mn-lt"/>
+          <a:ea typeface="+mn-ea"/>
+          <a:cs typeface="+mn-cs"/>
+        </a:defRPr>
+      </a:lvl7pPr>
+      <a:lvl8pPr marL="3429000" indent="-228600" algn="l" defTabSz="914400" rtl="0" eaLnBrk="1" latinLnBrk="0" hangingPunct="1">
+        <a:lnSpc>
+          <a:spcPct val="90000"/>
+        </a:lnSpc>
+        <a:spcBef>
+          <a:spcPts val="500"/>
+        </a:spcBef>
+        <a:buFont typeface="Arial" panose="020B0604020202020204" pitchFamily="34" charset="0"/>
+        <a:buChar char="•"/>
+        <a:defRPr sz="1800" kern="1200">
+          <a:solidFill>
+            <a:schemeClr val="tx1"/>
+          </a:solidFill>
+          <a:latin typeface="+mn-lt"/>
+          <a:ea typeface="+mn-ea"/>
+          <a:cs typeface="+mn-cs"/>
+        </a:defRPr>
+      </a:lvl8pPr>
+      <a:lvl9pPr marL="3886200" indent="-228600" algn="l" defTabSz="914400" rtl="0" eaLnBrk="1" latinLnBrk="0" hangingPunct="1">
+        <a:lnSpc>
+          <a:spcPct val="90000"/>
+        </a:lnSpc>
+        <a:spcBef>
+          <a:spcPts val="500"/>
+        </a:spcBef>
+        <a:buFont typeface="Arial" panose="020B0604020202020204" pitchFamily="34" charset="0"/>
+        <a:buChar char="•"/>
+        <a:defRPr sz="1800" kern="1200">
+          <a:solidFill>
+            <a:schemeClr val="tx1"/>
+          </a:solidFill>
+          <a:latin typeface="+mn-lt"/>
+          <a:ea typeface="+mn-ea"/>
+          <a:cs typeface="+mn-cs"/>
+        </a:defRPr>
+      </a:lvl9pPr>
+    </p:bodyStyle>
+    <p:otherStyle>
+      <a:defPPr>
+        <a:defRPr lang="fr-FR"/>
+      </a:defPPr>
+      <a:lvl1pPr marL="0" algn="l" defTabSz="914400" rtl="0" eaLnBrk="1" latinLnBrk="0" hangingPunct="1">
+        <a:defRPr sz="1800" kern="1200">
+          <a:solidFill>
+            <a:schemeClr val="tx1"/>
+          </a:solidFill>
+          <a:latin typeface="+mn-lt"/>
+          <a:ea typeface="+mn-ea"/>
+          <a:cs typeface="+mn-cs"/>
+        </a:defRPr>
+      </a:lvl1pPr>
+      <a:lvl2pPr marL="457200" algn="l" defTabSz="914400" rtl="0" eaLnBrk="1" latinLnBrk="0" hangingPunct="1">
+        <a:defRPr sz="1800" kern="1200">
+          <a:solidFill>
+            <a:schemeClr val="tx1"/>
+          </a:solidFill>
+          <a:latin typeface="+mn-lt"/>
+          <a:ea typeface="+mn-ea"/>
+          <a:cs typeface="+mn-cs"/>
+        </a:defRPr>
+      </a:lvl2pPr>
+      <a:lvl3pPr marL="914400" algn="l" defTabSz="914400" rtl="0" eaLnBrk="1" latinLnBrk="0" hangingPunct="1">
+        <a:defRPr sz="1800" kern="1200">
+          <a:solidFill>
+            <a:schemeClr val="tx1"/>
+          </a:solidFill>
+          <a:latin typeface="+mn-lt"/>
+          <a:ea typeface="+mn-ea"/>
+          <a:cs typeface="+mn-cs"/>
+        </a:defRPr>
+      </a:lvl3pPr>
+      <a:lvl4pPr marL="1371600" algn="l" defTabSz="914400" rtl="0" eaLnBrk="1" latinLnBrk="0" hangingPunct="1">
+        <a:defRPr sz="1800" kern="1200">
+          <a:solidFill>
+            <a:schemeClr val="tx1"/>
+          </a:solidFill>
+          <a:latin typeface="+mn-lt"/>
+          <a:ea typeface="+mn-ea"/>
+          <a:cs typeface="+mn-cs"/>
+        </a:defRPr>
+      </a:lvl4pPr>
+      <a:lvl5pPr marL="1828800" algn="l" defTabSz="914400" rtl="0" eaLnBrk="1" latinLnBrk="0" hangingPunct="1">
+        <a:defRPr sz="1800" kern="1200">
+          <a:solidFill>
+            <a:schemeClr val="tx1"/>
+          </a:solidFill>
+          <a:latin typeface="+mn-lt"/>
+          <a:ea typeface="+mn-ea"/>
+          <a:cs typeface="+mn-cs"/>
+        </a:defRPr>
+      </a:lvl5pPr>
+      <a:lvl6pPr marL="2286000" algn="l" defTabSz="914400" rtl="0" eaLnBrk="1" latinLnBrk="0" hangingPunct="1">
+        <a:defRPr sz="1800" kern="1200">
+          <a:solidFill>
+            <a:schemeClr val="tx1"/>
+          </a:solidFill>
+          <a:latin typeface="+mn-lt"/>
+          <a:ea typeface="+mn-ea"/>
+          <a:cs typeface="+mn-cs"/>
+        </a:defRPr>
+      </a:lvl6pPr>
+      <a:lvl7pPr marL="2743200" algn="l" defTabSz="914400" rtl="0" eaLnBrk="1" latinLnBrk="0" hangingPunct="1">
+        <a:defRPr sz="1800" kern="1200">
+          <a:solidFill>
+            <a:schemeClr val="tx1"/>
+          </a:solidFill>
+          <a:latin typeface="+mn-lt"/>
+          <a:ea typeface="+mn-ea"/>
+          <a:cs typeface="+mn-cs"/>
+        </a:defRPr>
+      </a:lvl7pPr>
+      <a:lvl8pPr marL="3200400" algn="l" defTabSz="914400" rtl="0" eaLnBrk="1" latinLnBrk="0" hangingPunct="1">
+        <a:defRPr sz="1800" kern="1200">
+          <a:solidFill>
+            <a:schemeClr val="tx1"/>
+          </a:solidFill>
+          <a:latin typeface="+mn-lt"/>
+          <a:ea typeface="+mn-ea"/>
+          <a:cs typeface="+mn-cs"/>
+        </a:defRPr>
+      </a:lvl8pPr>
+      <a:lvl9pPr marL="3657600" algn="l" defTabSz="914400" rtl="0" eaLnBrk="1" latinLnBrk="0" hangingPunct="1">
+        <a:defRPr sz="1800" kern="1200">
+          <a:solidFill>
+            <a:schemeClr val="tx1"/>
+          </a:solidFill>
+          <a:latin typeface="+mn-lt"/>
+          <a:ea typeface="+mn-ea"/>
+          <a:cs typeface="+mn-cs"/>
+        </a:defRPr>
+      </a:lvl9pPr>
+    </p:otherStyle>
+  </p:txStyles>
 </p:sldMaster>
 </file>
 
 <file path=ppt/slides/slide1.xml><?xml version="1.0" encoding="utf-8"?>
-<p:sld xmlns:a="http://schemas.openxmlformats.org/drawingml/2006/main" xmlns:p="http://schemas.openxmlformats.org/presentationml/2006/main" xmlns:r="http://schemas.openxmlformats.org/officeDocument/2006/relationships" xmlns:p14="http://schemas.microsoft.com/office/powerpoint/2010/main" xmlns:p15="http://schemas.microsoft.com/office/powerpoint/2012/main" xmlns:mc="http://schemas.openxmlformats.org/markup-compatibility/2006">
+<p:sld xmlns:a="http://schemas.openxmlformats.org/drawingml/2006/main" xmlns:r="http://schemas.openxmlformats.org/officeDocument/2006/relationships" xmlns:p="http://schemas.openxmlformats.org/presentationml/2006/main">
   <p:cSld>
     <p:spTree>
       <p:nvGrpSpPr>
@@ -1653,8 +2079,8 @@
         </p:nvSpPr>
         <p:spPr>
           <a:xfrm>
-            <a:off x="1301040" y="5760000"/>
-            <a:ext cx="16050600" cy="21959640"/>
+            <a:off x="1557395" y="15833594"/>
+            <a:ext cx="14158855" cy="9991365"/>
           </a:xfrm>
           <a:prstGeom prst="rect">
             <a:avLst/>
@@ -1665,15 +2091,22 @@
           </a:ln>
         </p:spPr>
         <p:style>
-          <a:lnRef idx="0"/>
-          <a:fillRef idx="0"/>
-          <a:effectRef idx="0"/>
+          <a:lnRef idx="0">
+            <a:scrgbClr r="0" g="0" b="0"/>
+          </a:lnRef>
+          <a:fillRef idx="0">
+            <a:scrgbClr r="0" g="0" b="0"/>
+          </a:fillRef>
+          <a:effectRef idx="0">
+            <a:scrgbClr r="0" g="0" b="0"/>
+          </a:effectRef>
           <a:fontRef idx="minor"/>
         </p:style>
         <p:txBody>
-          <a:bodyPr lIns="90000" rIns="90000" tIns="45000" bIns="45000">
+          <a:bodyPr lIns="90000" tIns="45000" rIns="90000" bIns="45000">
             <a:noAutofit/>
           </a:bodyPr>
+          <a:lstStyle/>
           <a:p>
             <a:pPr>
               <a:lnSpc>
@@ -1681,16 +2114,16 @@
               </a:lnSpc>
             </a:pPr>
             <a:r>
-              <a:rPr b="1" lang="fr-FR" sz="5000" spc="-1" strike="noStrike">
+              <a:rPr lang="fr-FR" sz="4400" b="1" strike="noStrike" spc="-1" dirty="0">
                 <a:solidFill>
-                  <a:srgbClr val="6c5098"/>
+                  <a:srgbClr val="92D050"/>
                 </a:solidFill>
                 <a:latin typeface="Arial"/>
                 <a:ea typeface="ＭＳ Ｐゴシック"/>
               </a:rPr>
-              <a:t>Comment modéliser une épidémie ?</a:t>
+              <a:t>Paramètres d’un modèle</a:t>
             </a:r>
-            <a:endParaRPr b="0" lang="fr-FR" sz="5000" spc="-1" strike="noStrike">
+            <a:endParaRPr lang="fr-FR" sz="4400" b="0" strike="noStrike" spc="-1" dirty="0">
               <a:latin typeface="Arial"/>
             </a:endParaRPr>
           </a:p>
@@ -1701,47 +2134,7 @@
               </a:lnSpc>
             </a:pPr>
             <a:r>
-              <a:rPr b="0" lang="fr-FR" sz="5000" spc="-1" strike="noStrike">
-                <a:solidFill>
-                  <a:srgbClr val="000000"/>
-                </a:solidFill>
-                <a:latin typeface="Arial"/>
-                <a:ea typeface="ＭＳ Ｐゴシック"/>
-              </a:rPr>
-              <a:t>Il existe de nombreux modèles qui permettent de simuler une épidémie. Nous présentons ici 6 modèles compartimentaux. Un tel modèle est représenté par les différents états possibles d’une personne. Il est commun de présenter ces modèles sous forme de graphe, chaque nœud est l’état d’une personne, et les arcs sont les transitions possibles (ayant pour poids une probabilité de cette transition). Un modèle assez simple et intuitif est le modèle « SIS », une personne est saine, ou infectée, avec possibilité de passer d’un état à l ‘autre.</a:t>
-            </a:r>
-            <a:endParaRPr b="0" lang="fr-FR" sz="5000" spc="-1" strike="noStrike">
-              <a:latin typeface="Arial"/>
-            </a:endParaRPr>
-          </a:p>
-          <a:p>
-            <a:pPr>
-              <a:lnSpc>
-                <a:spcPct val="150000"/>
-              </a:lnSpc>
-            </a:pPr>
-            <a:r>
-              <a:rPr b="1" lang="fr-FR" sz="4400" spc="-1" strike="noStrike">
-                <a:solidFill>
-                  <a:srgbClr val="92d050"/>
-                </a:solidFill>
-                <a:latin typeface="Arial"/>
-                <a:ea typeface="ＭＳ Ｐゴシック"/>
-              </a:rPr>
-              <a:t>Paramètres d’un modèle</a:t>
-            </a:r>
-            <a:endParaRPr b="0" lang="fr-FR" sz="4400" spc="-1" strike="noStrike">
-              <a:latin typeface="Arial"/>
-            </a:endParaRPr>
-          </a:p>
-          <a:p>
-            <a:pPr>
-              <a:lnSpc>
-                <a:spcPct val="150000"/>
-              </a:lnSpc>
-            </a:pPr>
-            <a:r>
-              <a:rPr b="0" lang="fr-FR" sz="5000" spc="-1" strike="noStrike">
+              <a:rPr lang="fr-FR" sz="5000" b="0" strike="noStrike" spc="-1" dirty="0">
                 <a:solidFill>
                   <a:srgbClr val="000000"/>
                 </a:solidFill>
@@ -1750,7 +2143,7 @@
               </a:rPr>
               <a:t>Le choix d’un modèle n’est pas suffisant pour simuler une épidémie, il faut en plus définir un certain nombre de paramètres. Nous pouvons séparer ces paramètres en 2 catégories : Les paramètres initiaux indiquent le nombre de personnes dans chaque état à l’instant initial , et les probabilités de passer d’un état à un autre.</a:t>
             </a:r>
-            <a:endParaRPr b="0" lang="fr-FR" sz="5000" spc="-1" strike="noStrike">
+            <a:endParaRPr lang="fr-FR" sz="5000" b="0" strike="noStrike" spc="-1" dirty="0">
               <a:latin typeface="Arial"/>
             </a:endParaRPr>
           </a:p>
@@ -1771,22 +2164,29 @@
             <a:avLst/>
           </a:prstGeom>
           <a:solidFill>
-            <a:srgbClr val="6c5098"/>
+            <a:srgbClr val="6C5098"/>
           </a:solidFill>
           <a:ln>
             <a:noFill/>
           </a:ln>
         </p:spPr>
         <p:style>
-          <a:lnRef idx="0"/>
-          <a:fillRef idx="0"/>
-          <a:effectRef idx="0"/>
+          <a:lnRef idx="0">
+            <a:scrgbClr r="0" g="0" b="0"/>
+          </a:lnRef>
+          <a:fillRef idx="0">
+            <a:scrgbClr r="0" g="0" b="0"/>
+          </a:fillRef>
+          <a:effectRef idx="0">
+            <a:scrgbClr r="0" g="0" b="0"/>
+          </a:effectRef>
           <a:fontRef idx="minor"/>
         </p:style>
         <p:txBody>
-          <a:bodyPr lIns="90000" rIns="90000" tIns="45000" bIns="45000" anchor="ctr">
+          <a:bodyPr lIns="90000" tIns="45000" rIns="90000" bIns="45000" anchor="ctr">
             <a:noAutofit/>
           </a:bodyPr>
+          <a:lstStyle/>
           <a:p>
             <a:pPr algn="ctr">
               <a:lnSpc>
@@ -1797,9 +2197,9 @@
               </a:spcAft>
             </a:pPr>
             <a:r>
-              <a:rPr b="1" lang="fr-FR" sz="6600" spc="-1" strike="noStrike">
+              <a:rPr lang="fr-FR" sz="6600" b="1" strike="noStrike" spc="-1">
                 <a:solidFill>
-                  <a:srgbClr val="ffffff"/>
+                  <a:srgbClr val="FFFFFF"/>
                 </a:solidFill>
                 <a:latin typeface="Arial"/>
                 <a:ea typeface="ＭＳ Ｐゴシック"/>
@@ -1807,9 +2207,9 @@
               <a:t>UNIVERSITÉ LIBRE DE BRUXELLES</a:t>
             </a:r>
             <a:r>
-              <a:rPr b="0" lang="fr-FR" sz="6600" spc="-1" strike="noStrike">
+              <a:rPr lang="fr-FR" sz="6600" b="0" strike="noStrike" spc="-1">
                 <a:solidFill>
-                  <a:srgbClr val="ffffff"/>
+                  <a:srgbClr val="FFFFFF"/>
                 </a:solidFill>
                 <a:latin typeface="Arial"/>
                 <a:ea typeface="ＭＳ Ｐゴシック"/>
@@ -1817,16 +2217,16 @@
               <a:t> - </a:t>
             </a:r>
             <a:r>
-              <a:rPr b="1" lang="fr-FR" sz="6600" spc="-1" strike="noStrike">
+              <a:rPr lang="fr-FR" sz="6600" b="1" strike="noStrike" spc="-1">
                 <a:solidFill>
-                  <a:srgbClr val="ffffff"/>
+                  <a:srgbClr val="FFFFFF"/>
                 </a:solidFill>
                 <a:latin typeface="Arial"/>
                 <a:ea typeface="ＭＳ Ｐゴシック"/>
               </a:rPr>
               <a:t>FACULTÉ DES SCIENCES</a:t>
             </a:r>
-            <a:endParaRPr b="0" lang="fr-FR" sz="6600" spc="-1" strike="noStrike">
+            <a:endParaRPr lang="fr-FR" sz="6600" b="0" strike="noStrike" spc="-1">
               <a:latin typeface="Arial"/>
             </a:endParaRPr>
           </a:p>
@@ -1834,30 +2234,7 @@
       </p:sp>
       <p:pic>
         <p:nvPicPr>
-          <p:cNvPr id="40" name="Picture 11" descr=""/>
-          <p:cNvPicPr/>
-          <p:nvPr/>
-        </p:nvPicPr>
-        <p:blipFill>
-          <a:blip r:embed="rId1"/>
-          <a:stretch/>
-        </p:blipFill>
-        <p:spPr>
-          <a:xfrm>
-            <a:off x="30203640" y="40878000"/>
-            <a:ext cx="2605680" cy="2605680"/>
-          </a:xfrm>
-          <a:prstGeom prst="rect">
-            <a:avLst/>
-          </a:prstGeom>
-          <a:ln>
-            <a:noFill/>
-          </a:ln>
-        </p:spPr>
-      </p:pic>
-      <p:pic>
-        <p:nvPicPr>
-          <p:cNvPr id="41" name="Picture 13" descr=""/>
+          <p:cNvPr id="40" name="Picture 11"/>
           <p:cNvPicPr/>
           <p:nvPr/>
         </p:nvPicPr>
@@ -1867,6 +2244,29 @@
         </p:blipFill>
         <p:spPr>
           <a:xfrm>
+            <a:off x="30203640" y="40878000"/>
+            <a:ext cx="2605680" cy="2605680"/>
+          </a:xfrm>
+          <a:prstGeom prst="rect">
+            <a:avLst/>
+          </a:prstGeom>
+          <a:ln>
+            <a:noFill/>
+          </a:ln>
+        </p:spPr>
+      </p:pic>
+      <p:pic>
+        <p:nvPicPr>
+          <p:cNvPr id="41" name="Picture 13"/>
+          <p:cNvPicPr/>
+          <p:nvPr/>
+        </p:nvPicPr>
+        <p:blipFill>
+          <a:blip r:embed="rId3"/>
+          <a:stretch/>
+        </p:blipFill>
+        <p:spPr>
+          <a:xfrm>
             <a:off x="25725600" y="40611600"/>
             <a:ext cx="4259880" cy="2985120"/>
           </a:xfrm>
@@ -1898,15 +2298,22 @@
           </a:ln>
         </p:spPr>
         <p:style>
-          <a:lnRef idx="0"/>
-          <a:fillRef idx="0"/>
-          <a:effectRef idx="0"/>
+          <a:lnRef idx="0">
+            <a:scrgbClr r="0" g="0" b="0"/>
+          </a:lnRef>
+          <a:fillRef idx="0">
+            <a:scrgbClr r="0" g="0" b="0"/>
+          </a:fillRef>
+          <a:effectRef idx="0">
+            <a:scrgbClr r="0" g="0" b="0"/>
+          </a:effectRef>
           <a:fontRef idx="minor"/>
         </p:style>
         <p:txBody>
-          <a:bodyPr lIns="90000" rIns="90000" tIns="45000" bIns="45000">
+          <a:bodyPr lIns="90000" tIns="45000" rIns="90000" bIns="45000">
             <a:noAutofit/>
           </a:bodyPr>
+          <a:lstStyle/>
           <a:p>
             <a:pPr algn="ctr">
               <a:lnSpc>
@@ -1914,7 +2321,7 @@
               </a:lnSpc>
             </a:pPr>
             <a:r>
-              <a:rPr b="0" lang="fr-FR" sz="1900" spc="-1" strike="noStrike">
+              <a:rPr lang="fr-FR" sz="1900" b="0" strike="noStrike" spc="-1">
                 <a:solidFill>
                   <a:srgbClr val="000000"/>
                 </a:solidFill>
@@ -1925,7 +2332,7 @@
             </a:r>
             <a:br/>
             <a:r>
-              <a:rPr b="0" lang="fr-FR" sz="1900" spc="-1" strike="noStrike">
+              <a:rPr lang="fr-FR" sz="1900" b="0" strike="noStrike" spc="-1">
                 <a:solidFill>
                   <a:srgbClr val="000000"/>
                 </a:solidFill>
@@ -1934,7 +2341,7 @@
               </a:rPr>
               <a:t>ainsi que la mention « Printemps des Sciences 2018 – Exposition des Sciences – Bruxelles »</a:t>
             </a:r>
-            <a:endParaRPr b="0" lang="fr-FR" sz="1900" spc="-1" strike="noStrike">
+            <a:endParaRPr lang="fr-FR" sz="1900" b="0" strike="noStrike" spc="-1">
               <a:latin typeface="Arial"/>
             </a:endParaRPr>
           </a:p>
@@ -1944,7 +2351,7 @@
                 <a:spcPct val="100000"/>
               </a:lnSpc>
             </a:pPr>
-            <a:endParaRPr b="0" lang="fr-FR" sz="1900" spc="-1" strike="noStrike">
+            <a:endParaRPr lang="fr-FR" sz="1900" b="0" strike="noStrike" spc="-1">
               <a:latin typeface="Arial"/>
             </a:endParaRPr>
           </a:p>
@@ -1970,15 +2377,22 @@
           </a:ln>
         </p:spPr>
         <p:style>
-          <a:lnRef idx="0"/>
-          <a:fillRef idx="0"/>
-          <a:effectRef idx="0"/>
+          <a:lnRef idx="0">
+            <a:scrgbClr r="0" g="0" b="0"/>
+          </a:lnRef>
+          <a:fillRef idx="0">
+            <a:scrgbClr r="0" g="0" b="0"/>
+          </a:fillRef>
+          <a:effectRef idx="0">
+            <a:scrgbClr r="0" g="0" b="0"/>
+          </a:effectRef>
           <a:fontRef idx="minor"/>
         </p:style>
         <p:txBody>
-          <a:bodyPr wrap="none" lIns="90000" rIns="90000" tIns="45000" bIns="45000">
+          <a:bodyPr wrap="none" lIns="90000" tIns="45000" rIns="90000" bIns="45000">
             <a:noAutofit/>
           </a:bodyPr>
+          <a:lstStyle/>
           <a:p>
             <a:pPr algn="ctr">
               <a:lnSpc>
@@ -1989,16 +2403,16 @@
               </a:spcAft>
             </a:pPr>
             <a:r>
-              <a:rPr b="1" lang="fr-FR" sz="4800" spc="-1" strike="noStrike">
+              <a:rPr lang="fr-FR" sz="4800" b="1" strike="noStrike" spc="-1" dirty="0">
                 <a:solidFill>
-                  <a:srgbClr val="6c5098"/>
+                  <a:srgbClr val="6C5098"/>
                 </a:solidFill>
                 <a:latin typeface="Arial"/>
                 <a:ea typeface="ＭＳ Ｐゴシック"/>
               </a:rPr>
               <a:t>Modélisation et simulation de la propagation d’une épidémie</a:t>
             </a:r>
-            <a:endParaRPr b="0" lang="fr-FR" sz="4800" spc="-1" strike="noStrike">
+            <a:endParaRPr lang="fr-FR" sz="4800" b="0" strike="noStrike" spc="-1" dirty="0">
               <a:latin typeface="Arial"/>
             </a:endParaRPr>
           </a:p>
@@ -2006,101 +2420,7 @@
       </p:sp>
       <p:pic>
         <p:nvPicPr>
-          <p:cNvPr id="44" name="Image 2" descr=""/>
-          <p:cNvPicPr/>
-          <p:nvPr/>
-        </p:nvPicPr>
-        <p:blipFill>
-          <a:blip r:embed="rId3"/>
-          <a:stretch/>
-        </p:blipFill>
-        <p:spPr>
-          <a:xfrm>
-            <a:off x="2202120" y="918360"/>
-            <a:ext cx="4885560" cy="4885560"/>
-          </a:xfrm>
-          <a:prstGeom prst="rect">
-            <a:avLst/>
-          </a:prstGeom>
-          <a:ln>
-            <a:noFill/>
-          </a:ln>
-        </p:spPr>
-      </p:pic>
-      <p:sp>
-        <p:nvSpPr>
-          <p:cNvPr id="45" name="CustomShape 5"/>
-          <p:cNvSpPr/>
-          <p:nvPr/>
-        </p:nvSpPr>
-        <p:spPr>
-          <a:xfrm>
-            <a:off x="1300680" y="27288000"/>
-            <a:ext cx="31597920" cy="5544000"/>
-          </a:xfrm>
-          <a:prstGeom prst="rect">
-            <a:avLst/>
-          </a:prstGeom>
-          <a:noFill/>
-          <a:ln>
-            <a:noFill/>
-          </a:ln>
-        </p:spPr>
-        <p:style>
-          <a:lnRef idx="0"/>
-          <a:fillRef idx="0"/>
-          <a:effectRef idx="0"/>
-          <a:fontRef idx="minor"/>
-        </p:style>
-        <p:txBody>
-          <a:bodyPr lIns="90000" rIns="90000" tIns="45000" bIns="45000">
-            <a:noAutofit/>
-          </a:bodyPr>
-          <a:p>
-            <a:pPr>
-              <a:lnSpc>
-                <a:spcPct val="150000"/>
-              </a:lnSpc>
-            </a:pPr>
-            <a:endParaRPr b="0" lang="fr-FR" sz="1800" spc="-1" strike="noStrike">
-              <a:latin typeface="Arial"/>
-            </a:endParaRPr>
-          </a:p>
-          <a:p>
-            <a:pPr>
-              <a:lnSpc>
-                <a:spcPct val="150000"/>
-              </a:lnSpc>
-            </a:pPr>
-            <a:r>
-              <a:rPr b="0" lang="fr-FR" sz="5000" spc="-1" strike="noStrike">
-                <a:solidFill>
-                  <a:srgbClr val="000000"/>
-                </a:solidFill>
-                <a:latin typeface="Arial"/>
-                <a:ea typeface="ＭＳ Ｐゴシック"/>
-              </a:rPr>
-              <a:t>Exemple : avec le modèle « SIR » nous pouvons simuler le cas ou il y a initialement 999 personnes saines, une personne infectée et 0 personnes rétablies (et donc, dans une population totale de 1000 personnes). Si une personne saine a 0,2 % de chance de devenir infectée, et une personne infectée à 0,1 % de chance de guérir, nous obtenons les résultats suivants : </a:t>
-            </a:r>
-            <a:endParaRPr b="0" lang="fr-FR" sz="5000" spc="-1" strike="noStrike">
-              <a:latin typeface="Arial"/>
-            </a:endParaRPr>
-          </a:p>
-          <a:p>
-            <a:pPr>
-              <a:lnSpc>
-                <a:spcPct val="150000"/>
-              </a:lnSpc>
-            </a:pPr>
-            <a:endParaRPr b="0" lang="fr-FR" sz="5000" spc="-1" strike="noStrike">
-              <a:latin typeface="Arial"/>
-            </a:endParaRPr>
-          </a:p>
-        </p:txBody>
-      </p:sp>
-      <p:pic>
-        <p:nvPicPr>
-          <p:cNvPr id="46" name="" descr=""/>
+          <p:cNvPr id="44" name="Image 2"/>
           <p:cNvPicPr/>
           <p:nvPr/>
         </p:nvPicPr>
@@ -2110,8 +2430,8 @@
         </p:blipFill>
         <p:spPr>
           <a:xfrm>
-            <a:off x="17928000" y="7200000"/>
-            <a:ext cx="14970960" cy="20481120"/>
+            <a:off x="2202120" y="918360"/>
+            <a:ext cx="4885560" cy="4885560"/>
           </a:xfrm>
           <a:prstGeom prst="rect">
             <a:avLst/>
@@ -2121,9 +2441,77 @@
           </a:ln>
         </p:spPr>
       </p:pic>
+      <p:sp>
+        <p:nvSpPr>
+          <p:cNvPr id="45" name="CustomShape 5"/>
+          <p:cNvSpPr/>
+          <p:nvPr/>
+        </p:nvSpPr>
+        <p:spPr>
+          <a:xfrm>
+            <a:off x="1301430" y="29055696"/>
+            <a:ext cx="31597920" cy="5544000"/>
+          </a:xfrm>
+          <a:prstGeom prst="rect">
+            <a:avLst/>
+          </a:prstGeom>
+          <a:noFill/>
+          <a:ln>
+            <a:noFill/>
+          </a:ln>
+        </p:spPr>
+        <p:style>
+          <a:lnRef idx="0">
+            <a:scrgbClr r="0" g="0" b="0"/>
+          </a:lnRef>
+          <a:fillRef idx="0">
+            <a:scrgbClr r="0" g="0" b="0"/>
+          </a:fillRef>
+          <a:effectRef idx="0">
+            <a:scrgbClr r="0" g="0" b="0"/>
+          </a:effectRef>
+          <a:fontRef idx="minor"/>
+        </p:style>
+        <p:txBody>
+          <a:bodyPr lIns="90000" tIns="45000" rIns="90000" bIns="45000">
+            <a:noAutofit/>
+          </a:bodyPr>
+          <a:lstStyle/>
+          <a:p>
+            <a:pPr>
+              <a:lnSpc>
+                <a:spcPct val="150000"/>
+              </a:lnSpc>
+            </a:pPr>
+            <a:endParaRPr lang="fr-FR" sz="1800" b="0" strike="noStrike" spc="-1" dirty="0">
+              <a:latin typeface="Arial"/>
+            </a:endParaRPr>
+          </a:p>
+          <a:p>
+            <a:pPr>
+              <a:lnSpc>
+                <a:spcPct val="150000"/>
+              </a:lnSpc>
+            </a:pPr>
+            <a:r>
+              <a:rPr lang="fr-FR" sz="5000" b="0" strike="noStrike" spc="-1" dirty="0">
+                <a:solidFill>
+                  <a:srgbClr val="000000"/>
+                </a:solidFill>
+                <a:latin typeface="Arial"/>
+                <a:ea typeface="ＭＳ Ｐゴシック"/>
+              </a:rPr>
+              <a:t>Nous avons ici simuler le modèle SIR avec 999 personnes susceptibles et 1 infecté. On peut voir l’évolution qui varie en fonction des paramètres (taux de transmission, … )</a:t>
+            </a:r>
+            <a:endParaRPr lang="fr-FR" sz="5000" b="0" strike="noStrike" spc="-1" dirty="0">
+              <a:latin typeface="Arial"/>
+            </a:endParaRPr>
+          </a:p>
+        </p:txBody>
+      </p:sp>
       <p:pic>
         <p:nvPicPr>
-          <p:cNvPr id="47" name="" descr=""/>
+          <p:cNvPr id="47" name="Image 46"/>
           <p:cNvPicPr/>
           <p:nvPr/>
         </p:nvPicPr>
@@ -2144,16 +2532,218 @@
           </a:ln>
         </p:spPr>
       </p:pic>
+      <p:sp>
+        <p:nvSpPr>
+          <p:cNvPr id="14" name="ZoneTexte 13">
+            <a:extLst>
+              <a:ext uri="{FF2B5EF4-FFF2-40B4-BE49-F238E27FC236}">
+                <a16:creationId xmlns:a16="http://schemas.microsoft.com/office/drawing/2014/main" id="{676BD56D-9AD0-4B00-A41B-B7E7A8E27A25}"/>
+              </a:ext>
+            </a:extLst>
+          </p:cNvPr>
+          <p:cNvSpPr txBox="1"/>
+          <p:nvPr/>
+        </p:nvSpPr>
+        <p:spPr>
+          <a:xfrm>
+            <a:off x="14968615" y="3153602"/>
+            <a:ext cx="16373340" cy="10337189"/>
+          </a:xfrm>
+          <a:prstGeom prst="rect">
+            <a:avLst/>
+          </a:prstGeom>
+          <a:noFill/>
+        </p:spPr>
+        <p:txBody>
+          <a:bodyPr wrap="square" rtlCol="0">
+            <a:spAutoFit/>
+          </a:bodyPr>
+          <a:lstStyle/>
+          <a:p>
+            <a:pPr>
+              <a:lnSpc>
+                <a:spcPct val="150000"/>
+              </a:lnSpc>
+            </a:pPr>
+            <a:r>
+              <a:rPr lang="fr-FR" sz="5000" b="1" spc="-1" dirty="0">
+                <a:solidFill>
+                  <a:srgbClr val="6C5098"/>
+                </a:solidFill>
+                <a:ea typeface="ＭＳ Ｐゴシック"/>
+              </a:rPr>
+              <a:t>Comment modéliser une épidémie ?</a:t>
+            </a:r>
+            <a:endParaRPr lang="fr-FR" sz="5000" spc="-1" dirty="0"/>
+          </a:p>
+          <a:p>
+            <a:pPr>
+              <a:lnSpc>
+                <a:spcPct val="150000"/>
+              </a:lnSpc>
+            </a:pPr>
+            <a:r>
+              <a:rPr lang="fr-FR" sz="5000" spc="-1" dirty="0">
+                <a:solidFill>
+                  <a:srgbClr val="000000"/>
+                </a:solidFill>
+                <a:ea typeface="ＭＳ Ｐゴシック"/>
+              </a:rPr>
+              <a:t>Il existe de nombreux modèles qui permettent de simuler une épidémie. Nous présentons ici 6 modèles compartimentaux. Un tel modèle est représenté par les différents états possibles d’une personne. Il est commun de présenter ces modèles sous forme de graphe, chaque nœud est l’état d’une personne, et les arcs sont les transitions possibles (ayant pour poids une probabilité de cette transition).</a:t>
+            </a:r>
+            <a:endParaRPr lang="fr-FR" dirty="0"/>
+          </a:p>
+        </p:txBody>
+      </p:sp>
+      <p:pic>
+        <p:nvPicPr>
+          <p:cNvPr id="17" name="Image 16">
+            <a:extLst>
+              <a:ext uri="{FF2B5EF4-FFF2-40B4-BE49-F238E27FC236}">
+                <a16:creationId xmlns:a16="http://schemas.microsoft.com/office/drawing/2014/main" id="{DB9C4EF1-1642-440B-9986-EB173031E782}"/>
+              </a:ext>
+            </a:extLst>
+          </p:cNvPr>
+          <p:cNvPicPr>
+            <a:picLocks noChangeAspect="1"/>
+          </p:cNvPicPr>
+          <p:nvPr/>
+        </p:nvPicPr>
+        <p:blipFill>
+          <a:blip r:embed="rId6">
+            <a:extLst>
+              <a:ext uri="{28A0092B-C50C-407E-A947-70E740481C1C}">
+                <a14:useLocalDpi xmlns:a14="http://schemas.microsoft.com/office/drawing/2010/main" val="0"/>
+              </a:ext>
+            </a:extLst>
+          </a:blip>
+          <a:stretch>
+            <a:fillRect/>
+          </a:stretch>
+        </p:blipFill>
+        <p:spPr>
+          <a:xfrm>
+            <a:off x="1832040" y="8665406"/>
+            <a:ext cx="6687483" cy="6315956"/>
+          </a:xfrm>
+          <a:prstGeom prst="rect">
+            <a:avLst/>
+          </a:prstGeom>
+        </p:spPr>
+      </p:pic>
+      <p:pic>
+        <p:nvPicPr>
+          <p:cNvPr id="19" name="Image 18">
+            <a:extLst>
+              <a:ext uri="{FF2B5EF4-FFF2-40B4-BE49-F238E27FC236}">
+                <a16:creationId xmlns:a16="http://schemas.microsoft.com/office/drawing/2014/main" id="{123BD8D2-F802-4B0D-BB25-466D974FE224}"/>
+              </a:ext>
+            </a:extLst>
+          </p:cNvPr>
+          <p:cNvPicPr>
+            <a:picLocks noChangeAspect="1"/>
+          </p:cNvPicPr>
+          <p:nvPr/>
+        </p:nvPicPr>
+        <p:blipFill>
+          <a:blip r:embed="rId7">
+            <a:extLst>
+              <a:ext uri="{28A0092B-C50C-407E-A947-70E740481C1C}">
+                <a14:useLocalDpi xmlns:a14="http://schemas.microsoft.com/office/drawing/2010/main" val="0"/>
+              </a:ext>
+            </a:extLst>
+          </a:blip>
+          <a:stretch>
+            <a:fillRect/>
+          </a:stretch>
+        </p:blipFill>
+        <p:spPr>
+          <a:xfrm>
+            <a:off x="9537191" y="5190198"/>
+            <a:ext cx="4525006" cy="6182588"/>
+          </a:xfrm>
+          <a:prstGeom prst="rect">
+            <a:avLst/>
+          </a:prstGeom>
+        </p:spPr>
+      </p:pic>
+      <p:pic>
+        <p:nvPicPr>
+          <p:cNvPr id="21" name="Image 20">
+            <a:extLst>
+              <a:ext uri="{FF2B5EF4-FFF2-40B4-BE49-F238E27FC236}">
+                <a16:creationId xmlns:a16="http://schemas.microsoft.com/office/drawing/2014/main" id="{E1D3A767-A310-4BBF-903D-7F1494DA9CF9}"/>
+              </a:ext>
+            </a:extLst>
+          </p:cNvPr>
+          <p:cNvPicPr>
+            <a:picLocks noChangeAspect="1"/>
+          </p:cNvPicPr>
+          <p:nvPr/>
+        </p:nvPicPr>
+        <p:blipFill>
+          <a:blip r:embed="rId8">
+            <a:extLst>
+              <a:ext uri="{28A0092B-C50C-407E-A947-70E740481C1C}">
+                <a14:useLocalDpi xmlns:a14="http://schemas.microsoft.com/office/drawing/2010/main" val="0"/>
+              </a:ext>
+            </a:extLst>
+          </a:blip>
+          <a:stretch>
+            <a:fillRect/>
+          </a:stretch>
+        </p:blipFill>
+        <p:spPr>
+          <a:xfrm>
+            <a:off x="15218863" y="18727822"/>
+            <a:ext cx="8173591" cy="7516274"/>
+          </a:xfrm>
+          <a:prstGeom prst="rect">
+            <a:avLst/>
+          </a:prstGeom>
+        </p:spPr>
+      </p:pic>
+      <p:pic>
+        <p:nvPicPr>
+          <p:cNvPr id="23" name="Image 22">
+            <a:extLst>
+              <a:ext uri="{FF2B5EF4-FFF2-40B4-BE49-F238E27FC236}">
+                <a16:creationId xmlns:a16="http://schemas.microsoft.com/office/drawing/2014/main" id="{2AF34476-81C3-46E2-A635-7F27CA24B683}"/>
+              </a:ext>
+            </a:extLst>
+          </p:cNvPr>
+          <p:cNvPicPr>
+            <a:picLocks noChangeAspect="1"/>
+          </p:cNvPicPr>
+          <p:nvPr/>
+        </p:nvPicPr>
+        <p:blipFill>
+          <a:blip r:embed="rId9">
+            <a:extLst>
+              <a:ext uri="{28A0092B-C50C-407E-A947-70E740481C1C}">
+                <a14:useLocalDpi xmlns:a14="http://schemas.microsoft.com/office/drawing/2010/main" val="0"/>
+              </a:ext>
+            </a:extLst>
+          </a:blip>
+          <a:stretch>
+            <a:fillRect/>
+          </a:stretch>
+        </p:blipFill>
+        <p:spPr>
+          <a:xfrm>
+            <a:off x="23392454" y="16518420"/>
+            <a:ext cx="8926171" cy="7440063"/>
+          </a:xfrm>
+          <a:prstGeom prst="rect">
+            <a:avLst/>
+          </a:prstGeom>
+        </p:spPr>
+      </p:pic>
     </p:spTree>
   </p:cSld>
-  <mc:AlternateContent>
-    <mc:Choice Requires="p14">
-      <p:transition spd="slow" p14:dur="2000"/>
-    </mc:Choice>
-    <mc:Fallback>
-      <p:transition spd="slow"/>
-    </mc:Fallback>
-  </mc:AlternateContent>
+  <p:clrMapOvr>
+    <a:masterClrMapping/>
+  </p:clrMapOvr>
 </p:sld>
 </file>
 
@@ -2174,28 +2764,28 @@
         <a:srgbClr val="808080"/>
       </a:lt2>
       <a:accent1>
-        <a:srgbClr val="bbe0e3"/>
+        <a:srgbClr val="BBE0E3"/>
       </a:accent1>
       <a:accent2>
         <a:srgbClr val="333399"/>
       </a:accent2>
       <a:accent3>
-        <a:srgbClr val="ffffff"/>
+        <a:srgbClr val="FFFFFF"/>
       </a:accent3>
       <a:accent4>
         <a:srgbClr val="000000"/>
       </a:accent4>
       <a:accent5>
-        <a:srgbClr val="daedef"/>
+        <a:srgbClr val="DAEDEF"/>
       </a:accent5>
       <a:accent6>
-        <a:srgbClr val="2d2d8a"/>
+        <a:srgbClr val="2D2D8A"/>
       </a:accent6>
       <a:hlink>
         <a:srgbClr val="009999"/>
       </a:hlink>
       <a:folHlink>
-        <a:srgbClr val="99cc00"/>
+        <a:srgbClr val="99CC00"/>
       </a:folHlink>
     </a:clrScheme>
     <a:fontScheme name="Office">
@@ -2380,5 +2970,7 @@
       </a:bgFillStyleLst>
     </a:fmtScheme>
   </a:themeElements>
+  <a:objectDefaults/>
+  <a:extraClrSchemeLst/>
 </a:theme>
 </file>
</xml_diff>